<commit_message>
working on excel sheet
</commit_message>
<xml_diff>
--- a/analyses/figures/muplotextras/muplotprep.pptx
+++ b/analyses/figures/muplotextras/muplotprep.pptx
@@ -5,13 +5,14 @@
     <p:sldMasterId id="2147483648" r:id="rId1"/>
   </p:sldMasterIdLst>
   <p:notesMasterIdLst>
-    <p:notesMasterId r:id="rId6"/>
+    <p:notesMasterId r:id="rId7"/>
   </p:notesMasterIdLst>
   <p:sldIdLst>
     <p:sldId id="256" r:id="rId2"/>
     <p:sldId id="259" r:id="rId3"/>
     <p:sldId id="257" r:id="rId4"/>
     <p:sldId id="258" r:id="rId5"/>
+    <p:sldId id="261" r:id="rId6"/>
   </p:sldIdLst>
   <p:sldSz cx="12192000" cy="6858000"/>
   <p:notesSz cx="6858000" cy="9144000"/>
@@ -200,7 +201,7 @@
           <a:p>
             <a:fld id="{50109146-7479-554D-95AE-0AFDDADBF6E9}" type="datetimeFigureOut">
               <a:rPr lang="en-US" smtClean="0"/>
-              <a:t>3/25/20</a:t>
+              <a:t>4/22/20</a:t>
             </a:fld>
             <a:endParaRPr lang="en-US"/>
           </a:p>
@@ -264,38 +265,37 @@
           <a:p>
             <a:pPr lvl="0"/>
             <a:r>
-              <a:rPr lang="en-US" smtClean="0"/>
+              <a:rPr lang="en-US"/>
               <a:t>Click to edit Master text styles</a:t>
             </a:r>
           </a:p>
           <a:p>
             <a:pPr lvl="1"/>
             <a:r>
-              <a:rPr lang="en-US" smtClean="0"/>
+              <a:rPr lang="en-US"/>
               <a:t>Second level</a:t>
             </a:r>
           </a:p>
           <a:p>
             <a:pPr lvl="2"/>
             <a:r>
-              <a:rPr lang="en-US" smtClean="0"/>
+              <a:rPr lang="en-US"/>
               <a:t>Third level</a:t>
             </a:r>
           </a:p>
           <a:p>
             <a:pPr lvl="3"/>
             <a:r>
-              <a:rPr lang="en-US" smtClean="0"/>
+              <a:rPr lang="en-US"/>
               <a:t>Fourth level</a:t>
             </a:r>
           </a:p>
           <a:p>
             <a:pPr lvl="4"/>
             <a:r>
-              <a:rPr lang="en-US" smtClean="0"/>
+              <a:rPr lang="en-US"/>
               <a:t>Fifth level</a:t>
             </a:r>
-            <a:endParaRPr lang="en-US"/>
           </a:p>
         </p:txBody>
       </p:sp>
@@ -490,7 +490,7 @@
           <p:cNvPr id="2" name="Title 1">
             <a:extLst>
               <a:ext uri="{FF2B5EF4-FFF2-40B4-BE49-F238E27FC236}">
-                <a16:creationId xmlns:a16="http://schemas.microsoft.com/office/drawing/2014/main" xmlns="" id="{8453FABD-E4E9-9047-ADFF-D9B1A30DE74E}"/>
+                <a16:creationId xmlns:a16="http://schemas.microsoft.com/office/drawing/2014/main" id="{8453FABD-E4E9-9047-ADFF-D9B1A30DE74E}"/>
               </a:ext>
             </a:extLst>
           </p:cNvPr>
@@ -527,7 +527,7 @@
           <p:cNvPr id="3" name="Subtitle 2">
             <a:extLst>
               <a:ext uri="{FF2B5EF4-FFF2-40B4-BE49-F238E27FC236}">
-                <a16:creationId xmlns:a16="http://schemas.microsoft.com/office/drawing/2014/main" xmlns="" id="{E812CE7C-65CB-014C-B68B-2E283794AEBF}"/>
+                <a16:creationId xmlns:a16="http://schemas.microsoft.com/office/drawing/2014/main" id="{E812CE7C-65CB-014C-B68B-2E283794AEBF}"/>
               </a:ext>
             </a:extLst>
           </p:cNvPr>
@@ -597,7 +597,7 @@
           <p:cNvPr id="4" name="Date Placeholder 3">
             <a:extLst>
               <a:ext uri="{FF2B5EF4-FFF2-40B4-BE49-F238E27FC236}">
-                <a16:creationId xmlns:a16="http://schemas.microsoft.com/office/drawing/2014/main" xmlns="" id="{C86D82C4-3D16-D043-8422-9366A4FAB731}"/>
+                <a16:creationId xmlns:a16="http://schemas.microsoft.com/office/drawing/2014/main" id="{C86D82C4-3D16-D043-8422-9366A4FAB731}"/>
               </a:ext>
             </a:extLst>
           </p:cNvPr>
@@ -615,7 +615,7 @@
           <a:p>
             <a:fld id="{61D5BA3A-DD4C-6840-8061-179B7C5E8DD5}" type="datetimeFigureOut">
               <a:rPr lang="en-US" smtClean="0"/>
-              <a:t>3/25/20</a:t>
+              <a:t>4/22/20</a:t>
             </a:fld>
             <a:endParaRPr lang="en-US"/>
           </a:p>
@@ -626,7 +626,7 @@
           <p:cNvPr id="5" name="Footer Placeholder 4">
             <a:extLst>
               <a:ext uri="{FF2B5EF4-FFF2-40B4-BE49-F238E27FC236}">
-                <a16:creationId xmlns:a16="http://schemas.microsoft.com/office/drawing/2014/main" xmlns="" id="{AD920BFD-135B-854E-8874-A5EE32644006}"/>
+                <a16:creationId xmlns:a16="http://schemas.microsoft.com/office/drawing/2014/main" id="{AD920BFD-135B-854E-8874-A5EE32644006}"/>
               </a:ext>
             </a:extLst>
           </p:cNvPr>
@@ -651,7 +651,7 @@
           <p:cNvPr id="6" name="Slide Number Placeholder 5">
             <a:extLst>
               <a:ext uri="{FF2B5EF4-FFF2-40B4-BE49-F238E27FC236}">
-                <a16:creationId xmlns:a16="http://schemas.microsoft.com/office/drawing/2014/main" xmlns="" id="{C3592458-EE36-D24A-AB19-5AA7CA4F544B}"/>
+                <a16:creationId xmlns:a16="http://schemas.microsoft.com/office/drawing/2014/main" id="{C3592458-EE36-D24A-AB19-5AA7CA4F544B}"/>
               </a:ext>
             </a:extLst>
           </p:cNvPr>
@@ -710,7 +710,7 @@
           <p:cNvPr id="2" name="Title 1">
             <a:extLst>
               <a:ext uri="{FF2B5EF4-FFF2-40B4-BE49-F238E27FC236}">
-                <a16:creationId xmlns:a16="http://schemas.microsoft.com/office/drawing/2014/main" xmlns="" id="{D38E3FBA-7A38-EE46-AABF-17EEF7FAA986}"/>
+                <a16:creationId xmlns:a16="http://schemas.microsoft.com/office/drawing/2014/main" id="{D38E3FBA-7A38-EE46-AABF-17EEF7FAA986}"/>
               </a:ext>
             </a:extLst>
           </p:cNvPr>
@@ -738,7 +738,7 @@
           <p:cNvPr id="3" name="Vertical Text Placeholder 2">
             <a:extLst>
               <a:ext uri="{FF2B5EF4-FFF2-40B4-BE49-F238E27FC236}">
-                <a16:creationId xmlns:a16="http://schemas.microsoft.com/office/drawing/2014/main" xmlns="" id="{2AFA6A16-48B6-F745-AB1D-AA38B1E45E48}"/>
+                <a16:creationId xmlns:a16="http://schemas.microsoft.com/office/drawing/2014/main" id="{2AFA6A16-48B6-F745-AB1D-AA38B1E45E48}"/>
               </a:ext>
             </a:extLst>
           </p:cNvPr>
@@ -795,7 +795,7 @@
           <p:cNvPr id="4" name="Date Placeholder 3">
             <a:extLst>
               <a:ext uri="{FF2B5EF4-FFF2-40B4-BE49-F238E27FC236}">
-                <a16:creationId xmlns:a16="http://schemas.microsoft.com/office/drawing/2014/main" xmlns="" id="{75C209F3-A925-4A4A-8175-91E88EB07D92}"/>
+                <a16:creationId xmlns:a16="http://schemas.microsoft.com/office/drawing/2014/main" id="{75C209F3-A925-4A4A-8175-91E88EB07D92}"/>
               </a:ext>
             </a:extLst>
           </p:cNvPr>
@@ -813,7 +813,7 @@
           <a:p>
             <a:fld id="{61D5BA3A-DD4C-6840-8061-179B7C5E8DD5}" type="datetimeFigureOut">
               <a:rPr lang="en-US" smtClean="0"/>
-              <a:t>3/25/20</a:t>
+              <a:t>4/22/20</a:t>
             </a:fld>
             <a:endParaRPr lang="en-US"/>
           </a:p>
@@ -824,7 +824,7 @@
           <p:cNvPr id="5" name="Footer Placeholder 4">
             <a:extLst>
               <a:ext uri="{FF2B5EF4-FFF2-40B4-BE49-F238E27FC236}">
-                <a16:creationId xmlns:a16="http://schemas.microsoft.com/office/drawing/2014/main" xmlns="" id="{E559691E-6F18-BC4E-8E6F-C70766F0FE2F}"/>
+                <a16:creationId xmlns:a16="http://schemas.microsoft.com/office/drawing/2014/main" id="{E559691E-6F18-BC4E-8E6F-C70766F0FE2F}"/>
               </a:ext>
             </a:extLst>
           </p:cNvPr>
@@ -849,7 +849,7 @@
           <p:cNvPr id="6" name="Slide Number Placeholder 5">
             <a:extLst>
               <a:ext uri="{FF2B5EF4-FFF2-40B4-BE49-F238E27FC236}">
-                <a16:creationId xmlns:a16="http://schemas.microsoft.com/office/drawing/2014/main" xmlns="" id="{DBC4E07F-B048-D749-8CED-142D4503B3BA}"/>
+                <a16:creationId xmlns:a16="http://schemas.microsoft.com/office/drawing/2014/main" id="{DBC4E07F-B048-D749-8CED-142D4503B3BA}"/>
               </a:ext>
             </a:extLst>
           </p:cNvPr>
@@ -908,7 +908,7 @@
           <p:cNvPr id="2" name="Vertical Title 1">
             <a:extLst>
               <a:ext uri="{FF2B5EF4-FFF2-40B4-BE49-F238E27FC236}">
-                <a16:creationId xmlns:a16="http://schemas.microsoft.com/office/drawing/2014/main" xmlns="" id="{A9D734E0-751C-E84B-B47C-89195DAD48A9}"/>
+                <a16:creationId xmlns:a16="http://schemas.microsoft.com/office/drawing/2014/main" id="{A9D734E0-751C-E84B-B47C-89195DAD48A9}"/>
               </a:ext>
             </a:extLst>
           </p:cNvPr>
@@ -941,7 +941,7 @@
           <p:cNvPr id="3" name="Vertical Text Placeholder 2">
             <a:extLst>
               <a:ext uri="{FF2B5EF4-FFF2-40B4-BE49-F238E27FC236}">
-                <a16:creationId xmlns:a16="http://schemas.microsoft.com/office/drawing/2014/main" xmlns="" id="{073ABDD3-6EA6-EA40-84EA-4ADAE2C7402A}"/>
+                <a16:creationId xmlns:a16="http://schemas.microsoft.com/office/drawing/2014/main" id="{073ABDD3-6EA6-EA40-84EA-4ADAE2C7402A}"/>
               </a:ext>
             </a:extLst>
           </p:cNvPr>
@@ -1003,7 +1003,7 @@
           <p:cNvPr id="4" name="Date Placeholder 3">
             <a:extLst>
               <a:ext uri="{FF2B5EF4-FFF2-40B4-BE49-F238E27FC236}">
-                <a16:creationId xmlns:a16="http://schemas.microsoft.com/office/drawing/2014/main" xmlns="" id="{BFF9A652-6CB1-3B4D-92DA-9CF8A77A15AC}"/>
+                <a16:creationId xmlns:a16="http://schemas.microsoft.com/office/drawing/2014/main" id="{BFF9A652-6CB1-3B4D-92DA-9CF8A77A15AC}"/>
               </a:ext>
             </a:extLst>
           </p:cNvPr>
@@ -1021,7 +1021,7 @@
           <a:p>
             <a:fld id="{61D5BA3A-DD4C-6840-8061-179B7C5E8DD5}" type="datetimeFigureOut">
               <a:rPr lang="en-US" smtClean="0"/>
-              <a:t>3/25/20</a:t>
+              <a:t>4/22/20</a:t>
             </a:fld>
             <a:endParaRPr lang="en-US"/>
           </a:p>
@@ -1032,7 +1032,7 @@
           <p:cNvPr id="5" name="Footer Placeholder 4">
             <a:extLst>
               <a:ext uri="{FF2B5EF4-FFF2-40B4-BE49-F238E27FC236}">
-                <a16:creationId xmlns:a16="http://schemas.microsoft.com/office/drawing/2014/main" xmlns="" id="{F24CD1E8-43B5-E24F-9FC3-3E26053678DC}"/>
+                <a16:creationId xmlns:a16="http://schemas.microsoft.com/office/drawing/2014/main" id="{F24CD1E8-43B5-E24F-9FC3-3E26053678DC}"/>
               </a:ext>
             </a:extLst>
           </p:cNvPr>
@@ -1057,7 +1057,7 @@
           <p:cNvPr id="6" name="Slide Number Placeholder 5">
             <a:extLst>
               <a:ext uri="{FF2B5EF4-FFF2-40B4-BE49-F238E27FC236}">
-                <a16:creationId xmlns:a16="http://schemas.microsoft.com/office/drawing/2014/main" xmlns="" id="{9CC369A1-2F43-0943-A1D1-30EE4DABFE62}"/>
+                <a16:creationId xmlns:a16="http://schemas.microsoft.com/office/drawing/2014/main" id="{9CC369A1-2F43-0943-A1D1-30EE4DABFE62}"/>
               </a:ext>
             </a:extLst>
           </p:cNvPr>
@@ -1116,7 +1116,7 @@
           <p:cNvPr id="2" name="Title 1">
             <a:extLst>
               <a:ext uri="{FF2B5EF4-FFF2-40B4-BE49-F238E27FC236}">
-                <a16:creationId xmlns:a16="http://schemas.microsoft.com/office/drawing/2014/main" xmlns="" id="{F30E9F7E-28DE-FD4A-B307-3E7F399ADFFE}"/>
+                <a16:creationId xmlns:a16="http://schemas.microsoft.com/office/drawing/2014/main" id="{F30E9F7E-28DE-FD4A-B307-3E7F399ADFFE}"/>
               </a:ext>
             </a:extLst>
           </p:cNvPr>
@@ -1144,7 +1144,7 @@
           <p:cNvPr id="3" name="Content Placeholder 2">
             <a:extLst>
               <a:ext uri="{FF2B5EF4-FFF2-40B4-BE49-F238E27FC236}">
-                <a16:creationId xmlns:a16="http://schemas.microsoft.com/office/drawing/2014/main" xmlns="" id="{7733F12B-5F6C-4541-A40F-10C7AE5152A3}"/>
+                <a16:creationId xmlns:a16="http://schemas.microsoft.com/office/drawing/2014/main" id="{7733F12B-5F6C-4541-A40F-10C7AE5152A3}"/>
               </a:ext>
             </a:extLst>
           </p:cNvPr>
@@ -1201,7 +1201,7 @@
           <p:cNvPr id="4" name="Date Placeholder 3">
             <a:extLst>
               <a:ext uri="{FF2B5EF4-FFF2-40B4-BE49-F238E27FC236}">
-                <a16:creationId xmlns:a16="http://schemas.microsoft.com/office/drawing/2014/main" xmlns="" id="{89896EB8-D8AB-5F47-95C0-D337513D8F12}"/>
+                <a16:creationId xmlns:a16="http://schemas.microsoft.com/office/drawing/2014/main" id="{89896EB8-D8AB-5F47-95C0-D337513D8F12}"/>
               </a:ext>
             </a:extLst>
           </p:cNvPr>
@@ -1219,7 +1219,7 @@
           <a:p>
             <a:fld id="{61D5BA3A-DD4C-6840-8061-179B7C5E8DD5}" type="datetimeFigureOut">
               <a:rPr lang="en-US" smtClean="0"/>
-              <a:t>3/25/20</a:t>
+              <a:t>4/22/20</a:t>
             </a:fld>
             <a:endParaRPr lang="en-US"/>
           </a:p>
@@ -1230,7 +1230,7 @@
           <p:cNvPr id="5" name="Footer Placeholder 4">
             <a:extLst>
               <a:ext uri="{FF2B5EF4-FFF2-40B4-BE49-F238E27FC236}">
-                <a16:creationId xmlns:a16="http://schemas.microsoft.com/office/drawing/2014/main" xmlns="" id="{CE18187F-97E9-2F45-8179-362ADD7E4757}"/>
+                <a16:creationId xmlns:a16="http://schemas.microsoft.com/office/drawing/2014/main" id="{CE18187F-97E9-2F45-8179-362ADD7E4757}"/>
               </a:ext>
             </a:extLst>
           </p:cNvPr>
@@ -1255,7 +1255,7 @@
           <p:cNvPr id="6" name="Slide Number Placeholder 5">
             <a:extLst>
               <a:ext uri="{FF2B5EF4-FFF2-40B4-BE49-F238E27FC236}">
-                <a16:creationId xmlns:a16="http://schemas.microsoft.com/office/drawing/2014/main" xmlns="" id="{E55CD062-B212-8244-BE4A-4C1F1B0D9242}"/>
+                <a16:creationId xmlns:a16="http://schemas.microsoft.com/office/drawing/2014/main" id="{E55CD062-B212-8244-BE4A-4C1F1B0D9242}"/>
               </a:ext>
             </a:extLst>
           </p:cNvPr>
@@ -1314,7 +1314,7 @@
           <p:cNvPr id="2" name="Title 1">
             <a:extLst>
               <a:ext uri="{FF2B5EF4-FFF2-40B4-BE49-F238E27FC236}">
-                <a16:creationId xmlns:a16="http://schemas.microsoft.com/office/drawing/2014/main" xmlns="" id="{727E3398-A0EB-EA40-B811-069419A06955}"/>
+                <a16:creationId xmlns:a16="http://schemas.microsoft.com/office/drawing/2014/main" id="{727E3398-A0EB-EA40-B811-069419A06955}"/>
               </a:ext>
             </a:extLst>
           </p:cNvPr>
@@ -1351,7 +1351,7 @@
           <p:cNvPr id="3" name="Text Placeholder 2">
             <a:extLst>
               <a:ext uri="{FF2B5EF4-FFF2-40B4-BE49-F238E27FC236}">
-                <a16:creationId xmlns:a16="http://schemas.microsoft.com/office/drawing/2014/main" xmlns="" id="{074EA196-0384-2542-9C88-08033C2F4BC1}"/>
+                <a16:creationId xmlns:a16="http://schemas.microsoft.com/office/drawing/2014/main" id="{074EA196-0384-2542-9C88-08033C2F4BC1}"/>
               </a:ext>
             </a:extLst>
           </p:cNvPr>
@@ -1476,7 +1476,7 @@
           <p:cNvPr id="4" name="Date Placeholder 3">
             <a:extLst>
               <a:ext uri="{FF2B5EF4-FFF2-40B4-BE49-F238E27FC236}">
-                <a16:creationId xmlns:a16="http://schemas.microsoft.com/office/drawing/2014/main" xmlns="" id="{0A23E10B-AFC7-FF43-8FE3-12CF7719234A}"/>
+                <a16:creationId xmlns:a16="http://schemas.microsoft.com/office/drawing/2014/main" id="{0A23E10B-AFC7-FF43-8FE3-12CF7719234A}"/>
               </a:ext>
             </a:extLst>
           </p:cNvPr>
@@ -1494,7 +1494,7 @@
           <a:p>
             <a:fld id="{61D5BA3A-DD4C-6840-8061-179B7C5E8DD5}" type="datetimeFigureOut">
               <a:rPr lang="en-US" smtClean="0"/>
-              <a:t>3/25/20</a:t>
+              <a:t>4/22/20</a:t>
             </a:fld>
             <a:endParaRPr lang="en-US"/>
           </a:p>
@@ -1505,7 +1505,7 @@
           <p:cNvPr id="5" name="Footer Placeholder 4">
             <a:extLst>
               <a:ext uri="{FF2B5EF4-FFF2-40B4-BE49-F238E27FC236}">
-                <a16:creationId xmlns:a16="http://schemas.microsoft.com/office/drawing/2014/main" xmlns="" id="{96692CAF-91F6-6247-B890-5C2275755A79}"/>
+                <a16:creationId xmlns:a16="http://schemas.microsoft.com/office/drawing/2014/main" id="{96692CAF-91F6-6247-B890-5C2275755A79}"/>
               </a:ext>
             </a:extLst>
           </p:cNvPr>
@@ -1530,7 +1530,7 @@
           <p:cNvPr id="6" name="Slide Number Placeholder 5">
             <a:extLst>
               <a:ext uri="{FF2B5EF4-FFF2-40B4-BE49-F238E27FC236}">
-                <a16:creationId xmlns:a16="http://schemas.microsoft.com/office/drawing/2014/main" xmlns="" id="{2EA5D881-B778-2541-8477-5A5255F2D7B7}"/>
+                <a16:creationId xmlns:a16="http://schemas.microsoft.com/office/drawing/2014/main" id="{2EA5D881-B778-2541-8477-5A5255F2D7B7}"/>
               </a:ext>
             </a:extLst>
           </p:cNvPr>
@@ -1589,7 +1589,7 @@
           <p:cNvPr id="2" name="Title 1">
             <a:extLst>
               <a:ext uri="{FF2B5EF4-FFF2-40B4-BE49-F238E27FC236}">
-                <a16:creationId xmlns:a16="http://schemas.microsoft.com/office/drawing/2014/main" xmlns="" id="{894AFEB6-847C-504F-AAAB-888FD204FB45}"/>
+                <a16:creationId xmlns:a16="http://schemas.microsoft.com/office/drawing/2014/main" id="{894AFEB6-847C-504F-AAAB-888FD204FB45}"/>
               </a:ext>
             </a:extLst>
           </p:cNvPr>
@@ -1617,7 +1617,7 @@
           <p:cNvPr id="3" name="Content Placeholder 2">
             <a:extLst>
               <a:ext uri="{FF2B5EF4-FFF2-40B4-BE49-F238E27FC236}">
-                <a16:creationId xmlns:a16="http://schemas.microsoft.com/office/drawing/2014/main" xmlns="" id="{40D354E6-B1D7-9F4E-A706-22BE6B51BFC2}"/>
+                <a16:creationId xmlns:a16="http://schemas.microsoft.com/office/drawing/2014/main" id="{40D354E6-B1D7-9F4E-A706-22BE6B51BFC2}"/>
               </a:ext>
             </a:extLst>
           </p:cNvPr>
@@ -1679,7 +1679,7 @@
           <p:cNvPr id="4" name="Content Placeholder 3">
             <a:extLst>
               <a:ext uri="{FF2B5EF4-FFF2-40B4-BE49-F238E27FC236}">
-                <a16:creationId xmlns:a16="http://schemas.microsoft.com/office/drawing/2014/main" xmlns="" id="{4CD54C3B-7B83-784C-8CD1-5A2634929230}"/>
+                <a16:creationId xmlns:a16="http://schemas.microsoft.com/office/drawing/2014/main" id="{4CD54C3B-7B83-784C-8CD1-5A2634929230}"/>
               </a:ext>
             </a:extLst>
           </p:cNvPr>
@@ -1741,7 +1741,7 @@
           <p:cNvPr id="5" name="Date Placeholder 4">
             <a:extLst>
               <a:ext uri="{FF2B5EF4-FFF2-40B4-BE49-F238E27FC236}">
-                <a16:creationId xmlns:a16="http://schemas.microsoft.com/office/drawing/2014/main" xmlns="" id="{8E7C8075-55C7-3D45-8D4E-65CFAC212810}"/>
+                <a16:creationId xmlns:a16="http://schemas.microsoft.com/office/drawing/2014/main" id="{8E7C8075-55C7-3D45-8D4E-65CFAC212810}"/>
               </a:ext>
             </a:extLst>
           </p:cNvPr>
@@ -1759,7 +1759,7 @@
           <a:p>
             <a:fld id="{61D5BA3A-DD4C-6840-8061-179B7C5E8DD5}" type="datetimeFigureOut">
               <a:rPr lang="en-US" smtClean="0"/>
-              <a:t>3/25/20</a:t>
+              <a:t>4/22/20</a:t>
             </a:fld>
             <a:endParaRPr lang="en-US"/>
           </a:p>
@@ -1770,7 +1770,7 @@
           <p:cNvPr id="6" name="Footer Placeholder 5">
             <a:extLst>
               <a:ext uri="{FF2B5EF4-FFF2-40B4-BE49-F238E27FC236}">
-                <a16:creationId xmlns:a16="http://schemas.microsoft.com/office/drawing/2014/main" xmlns="" id="{3D5D73CA-92D5-3849-AA14-21FE79B1B82A}"/>
+                <a16:creationId xmlns:a16="http://schemas.microsoft.com/office/drawing/2014/main" id="{3D5D73CA-92D5-3849-AA14-21FE79B1B82A}"/>
               </a:ext>
             </a:extLst>
           </p:cNvPr>
@@ -1795,7 +1795,7 @@
           <p:cNvPr id="7" name="Slide Number Placeholder 6">
             <a:extLst>
               <a:ext uri="{FF2B5EF4-FFF2-40B4-BE49-F238E27FC236}">
-                <a16:creationId xmlns:a16="http://schemas.microsoft.com/office/drawing/2014/main" xmlns="" id="{3BC06EB4-946E-0E48-B78F-FA83BD85D51D}"/>
+                <a16:creationId xmlns:a16="http://schemas.microsoft.com/office/drawing/2014/main" id="{3BC06EB4-946E-0E48-B78F-FA83BD85D51D}"/>
               </a:ext>
             </a:extLst>
           </p:cNvPr>
@@ -1854,7 +1854,7 @@
           <p:cNvPr id="2" name="Title 1">
             <a:extLst>
               <a:ext uri="{FF2B5EF4-FFF2-40B4-BE49-F238E27FC236}">
-                <a16:creationId xmlns:a16="http://schemas.microsoft.com/office/drawing/2014/main" xmlns="" id="{4A684859-EF7A-3847-85C6-5B42F9B6CBDB}"/>
+                <a16:creationId xmlns:a16="http://schemas.microsoft.com/office/drawing/2014/main" id="{4A684859-EF7A-3847-85C6-5B42F9B6CBDB}"/>
               </a:ext>
             </a:extLst>
           </p:cNvPr>
@@ -1887,7 +1887,7 @@
           <p:cNvPr id="3" name="Text Placeholder 2">
             <a:extLst>
               <a:ext uri="{FF2B5EF4-FFF2-40B4-BE49-F238E27FC236}">
-                <a16:creationId xmlns:a16="http://schemas.microsoft.com/office/drawing/2014/main" xmlns="" id="{5356628A-14C9-1947-99F4-9E57332FF07A}"/>
+                <a16:creationId xmlns:a16="http://schemas.microsoft.com/office/drawing/2014/main" id="{5356628A-14C9-1947-99F4-9E57332FF07A}"/>
               </a:ext>
             </a:extLst>
           </p:cNvPr>
@@ -1958,7 +1958,7 @@
           <p:cNvPr id="4" name="Content Placeholder 3">
             <a:extLst>
               <a:ext uri="{FF2B5EF4-FFF2-40B4-BE49-F238E27FC236}">
-                <a16:creationId xmlns:a16="http://schemas.microsoft.com/office/drawing/2014/main" xmlns="" id="{62EDCB5F-24C1-7F4C-8DA6-74114623A9A0}"/>
+                <a16:creationId xmlns:a16="http://schemas.microsoft.com/office/drawing/2014/main" id="{62EDCB5F-24C1-7F4C-8DA6-74114623A9A0}"/>
               </a:ext>
             </a:extLst>
           </p:cNvPr>
@@ -2020,7 +2020,7 @@
           <p:cNvPr id="5" name="Text Placeholder 4">
             <a:extLst>
               <a:ext uri="{FF2B5EF4-FFF2-40B4-BE49-F238E27FC236}">
-                <a16:creationId xmlns:a16="http://schemas.microsoft.com/office/drawing/2014/main" xmlns="" id="{0A66AF43-1D49-834C-ACED-421D085F6200}"/>
+                <a16:creationId xmlns:a16="http://schemas.microsoft.com/office/drawing/2014/main" id="{0A66AF43-1D49-834C-ACED-421D085F6200}"/>
               </a:ext>
             </a:extLst>
           </p:cNvPr>
@@ -2091,7 +2091,7 @@
           <p:cNvPr id="6" name="Content Placeholder 5">
             <a:extLst>
               <a:ext uri="{FF2B5EF4-FFF2-40B4-BE49-F238E27FC236}">
-                <a16:creationId xmlns:a16="http://schemas.microsoft.com/office/drawing/2014/main" xmlns="" id="{139B4CE2-6A66-E046-B11A-CAA2BAE34E24}"/>
+                <a16:creationId xmlns:a16="http://schemas.microsoft.com/office/drawing/2014/main" id="{139B4CE2-6A66-E046-B11A-CAA2BAE34E24}"/>
               </a:ext>
             </a:extLst>
           </p:cNvPr>
@@ -2153,7 +2153,7 @@
           <p:cNvPr id="7" name="Date Placeholder 6">
             <a:extLst>
               <a:ext uri="{FF2B5EF4-FFF2-40B4-BE49-F238E27FC236}">
-                <a16:creationId xmlns:a16="http://schemas.microsoft.com/office/drawing/2014/main" xmlns="" id="{3FDF00AD-DEB6-E042-9F70-957C8E00C965}"/>
+                <a16:creationId xmlns:a16="http://schemas.microsoft.com/office/drawing/2014/main" id="{3FDF00AD-DEB6-E042-9F70-957C8E00C965}"/>
               </a:ext>
             </a:extLst>
           </p:cNvPr>
@@ -2171,7 +2171,7 @@
           <a:p>
             <a:fld id="{61D5BA3A-DD4C-6840-8061-179B7C5E8DD5}" type="datetimeFigureOut">
               <a:rPr lang="en-US" smtClean="0"/>
-              <a:t>3/25/20</a:t>
+              <a:t>4/22/20</a:t>
             </a:fld>
             <a:endParaRPr lang="en-US"/>
           </a:p>
@@ -2182,7 +2182,7 @@
           <p:cNvPr id="8" name="Footer Placeholder 7">
             <a:extLst>
               <a:ext uri="{FF2B5EF4-FFF2-40B4-BE49-F238E27FC236}">
-                <a16:creationId xmlns:a16="http://schemas.microsoft.com/office/drawing/2014/main" xmlns="" id="{300050ED-21A7-CD4B-B166-00E082F0B43C}"/>
+                <a16:creationId xmlns:a16="http://schemas.microsoft.com/office/drawing/2014/main" id="{300050ED-21A7-CD4B-B166-00E082F0B43C}"/>
               </a:ext>
             </a:extLst>
           </p:cNvPr>
@@ -2207,7 +2207,7 @@
           <p:cNvPr id="9" name="Slide Number Placeholder 8">
             <a:extLst>
               <a:ext uri="{FF2B5EF4-FFF2-40B4-BE49-F238E27FC236}">
-                <a16:creationId xmlns:a16="http://schemas.microsoft.com/office/drawing/2014/main" xmlns="" id="{2C78218E-69B4-F644-9A33-2C1126772D49}"/>
+                <a16:creationId xmlns:a16="http://schemas.microsoft.com/office/drawing/2014/main" id="{2C78218E-69B4-F644-9A33-2C1126772D49}"/>
               </a:ext>
             </a:extLst>
           </p:cNvPr>
@@ -2266,7 +2266,7 @@
           <p:cNvPr id="2" name="Title 1">
             <a:extLst>
               <a:ext uri="{FF2B5EF4-FFF2-40B4-BE49-F238E27FC236}">
-                <a16:creationId xmlns:a16="http://schemas.microsoft.com/office/drawing/2014/main" xmlns="" id="{485C7793-AFCC-F949-887D-033779B2C2D1}"/>
+                <a16:creationId xmlns:a16="http://schemas.microsoft.com/office/drawing/2014/main" id="{485C7793-AFCC-F949-887D-033779B2C2D1}"/>
               </a:ext>
             </a:extLst>
           </p:cNvPr>
@@ -2294,7 +2294,7 @@
           <p:cNvPr id="3" name="Date Placeholder 2">
             <a:extLst>
               <a:ext uri="{FF2B5EF4-FFF2-40B4-BE49-F238E27FC236}">
-                <a16:creationId xmlns:a16="http://schemas.microsoft.com/office/drawing/2014/main" xmlns="" id="{BD78F454-8283-E446-9DC9-5013C74B16C1}"/>
+                <a16:creationId xmlns:a16="http://schemas.microsoft.com/office/drawing/2014/main" id="{BD78F454-8283-E446-9DC9-5013C74B16C1}"/>
               </a:ext>
             </a:extLst>
           </p:cNvPr>
@@ -2312,7 +2312,7 @@
           <a:p>
             <a:fld id="{61D5BA3A-DD4C-6840-8061-179B7C5E8DD5}" type="datetimeFigureOut">
               <a:rPr lang="en-US" smtClean="0"/>
-              <a:t>3/25/20</a:t>
+              <a:t>4/22/20</a:t>
             </a:fld>
             <a:endParaRPr lang="en-US"/>
           </a:p>
@@ -2323,7 +2323,7 @@
           <p:cNvPr id="4" name="Footer Placeholder 3">
             <a:extLst>
               <a:ext uri="{FF2B5EF4-FFF2-40B4-BE49-F238E27FC236}">
-                <a16:creationId xmlns:a16="http://schemas.microsoft.com/office/drawing/2014/main" xmlns="" id="{D63B1EDB-88AC-A64B-B4C0-CE98E0CD7443}"/>
+                <a16:creationId xmlns:a16="http://schemas.microsoft.com/office/drawing/2014/main" id="{D63B1EDB-88AC-A64B-B4C0-CE98E0CD7443}"/>
               </a:ext>
             </a:extLst>
           </p:cNvPr>
@@ -2348,7 +2348,7 @@
           <p:cNvPr id="5" name="Slide Number Placeholder 4">
             <a:extLst>
               <a:ext uri="{FF2B5EF4-FFF2-40B4-BE49-F238E27FC236}">
-                <a16:creationId xmlns:a16="http://schemas.microsoft.com/office/drawing/2014/main" xmlns="" id="{24013518-E204-BC43-9E23-33617545DB6F}"/>
+                <a16:creationId xmlns:a16="http://schemas.microsoft.com/office/drawing/2014/main" id="{24013518-E204-BC43-9E23-33617545DB6F}"/>
               </a:ext>
             </a:extLst>
           </p:cNvPr>
@@ -2407,7 +2407,7 @@
           <p:cNvPr id="2" name="Date Placeholder 1">
             <a:extLst>
               <a:ext uri="{FF2B5EF4-FFF2-40B4-BE49-F238E27FC236}">
-                <a16:creationId xmlns:a16="http://schemas.microsoft.com/office/drawing/2014/main" xmlns="" id="{CB6B133D-CE73-D742-A128-DA8A4A1BC3A3}"/>
+                <a16:creationId xmlns:a16="http://schemas.microsoft.com/office/drawing/2014/main" id="{CB6B133D-CE73-D742-A128-DA8A4A1BC3A3}"/>
               </a:ext>
             </a:extLst>
           </p:cNvPr>
@@ -2425,7 +2425,7 @@
           <a:p>
             <a:fld id="{61D5BA3A-DD4C-6840-8061-179B7C5E8DD5}" type="datetimeFigureOut">
               <a:rPr lang="en-US" smtClean="0"/>
-              <a:t>3/25/20</a:t>
+              <a:t>4/22/20</a:t>
             </a:fld>
             <a:endParaRPr lang="en-US"/>
           </a:p>
@@ -2436,7 +2436,7 @@
           <p:cNvPr id="3" name="Footer Placeholder 2">
             <a:extLst>
               <a:ext uri="{FF2B5EF4-FFF2-40B4-BE49-F238E27FC236}">
-                <a16:creationId xmlns:a16="http://schemas.microsoft.com/office/drawing/2014/main" xmlns="" id="{7F145261-651D-7847-A6F7-E3D562EE3882}"/>
+                <a16:creationId xmlns:a16="http://schemas.microsoft.com/office/drawing/2014/main" id="{7F145261-651D-7847-A6F7-E3D562EE3882}"/>
               </a:ext>
             </a:extLst>
           </p:cNvPr>
@@ -2461,7 +2461,7 @@
           <p:cNvPr id="4" name="Slide Number Placeholder 3">
             <a:extLst>
               <a:ext uri="{FF2B5EF4-FFF2-40B4-BE49-F238E27FC236}">
-                <a16:creationId xmlns:a16="http://schemas.microsoft.com/office/drawing/2014/main" xmlns="" id="{8580BFFB-BEA3-1346-9DBD-5A1425B78F58}"/>
+                <a16:creationId xmlns:a16="http://schemas.microsoft.com/office/drawing/2014/main" id="{8580BFFB-BEA3-1346-9DBD-5A1425B78F58}"/>
               </a:ext>
             </a:extLst>
           </p:cNvPr>
@@ -2520,7 +2520,7 @@
           <p:cNvPr id="2" name="Title 1">
             <a:extLst>
               <a:ext uri="{FF2B5EF4-FFF2-40B4-BE49-F238E27FC236}">
-                <a16:creationId xmlns:a16="http://schemas.microsoft.com/office/drawing/2014/main" xmlns="" id="{B14BE765-ED0F-BA4B-A915-600C3342A4B7}"/>
+                <a16:creationId xmlns:a16="http://schemas.microsoft.com/office/drawing/2014/main" id="{B14BE765-ED0F-BA4B-A915-600C3342A4B7}"/>
               </a:ext>
             </a:extLst>
           </p:cNvPr>
@@ -2557,7 +2557,7 @@
           <p:cNvPr id="3" name="Content Placeholder 2">
             <a:extLst>
               <a:ext uri="{FF2B5EF4-FFF2-40B4-BE49-F238E27FC236}">
-                <a16:creationId xmlns:a16="http://schemas.microsoft.com/office/drawing/2014/main" xmlns="" id="{844631E7-E116-1B4D-891A-0A82002CC5F9}"/>
+                <a16:creationId xmlns:a16="http://schemas.microsoft.com/office/drawing/2014/main" id="{844631E7-E116-1B4D-891A-0A82002CC5F9}"/>
               </a:ext>
             </a:extLst>
           </p:cNvPr>
@@ -2647,7 +2647,7 @@
           <p:cNvPr id="4" name="Text Placeholder 3">
             <a:extLst>
               <a:ext uri="{FF2B5EF4-FFF2-40B4-BE49-F238E27FC236}">
-                <a16:creationId xmlns:a16="http://schemas.microsoft.com/office/drawing/2014/main" xmlns="" id="{A67C16F8-FAC5-C645-9AB4-71CF1291347F}"/>
+                <a16:creationId xmlns:a16="http://schemas.microsoft.com/office/drawing/2014/main" id="{A67C16F8-FAC5-C645-9AB4-71CF1291347F}"/>
               </a:ext>
             </a:extLst>
           </p:cNvPr>
@@ -2718,7 +2718,7 @@
           <p:cNvPr id="5" name="Date Placeholder 4">
             <a:extLst>
               <a:ext uri="{FF2B5EF4-FFF2-40B4-BE49-F238E27FC236}">
-                <a16:creationId xmlns:a16="http://schemas.microsoft.com/office/drawing/2014/main" xmlns="" id="{6D9C6FDB-33E8-E546-B4F4-7138284F3B52}"/>
+                <a16:creationId xmlns:a16="http://schemas.microsoft.com/office/drawing/2014/main" id="{6D9C6FDB-33E8-E546-B4F4-7138284F3B52}"/>
               </a:ext>
             </a:extLst>
           </p:cNvPr>
@@ -2736,7 +2736,7 @@
           <a:p>
             <a:fld id="{61D5BA3A-DD4C-6840-8061-179B7C5E8DD5}" type="datetimeFigureOut">
               <a:rPr lang="en-US" smtClean="0"/>
-              <a:t>3/25/20</a:t>
+              <a:t>4/22/20</a:t>
             </a:fld>
             <a:endParaRPr lang="en-US"/>
           </a:p>
@@ -2747,7 +2747,7 @@
           <p:cNvPr id="6" name="Footer Placeholder 5">
             <a:extLst>
               <a:ext uri="{FF2B5EF4-FFF2-40B4-BE49-F238E27FC236}">
-                <a16:creationId xmlns:a16="http://schemas.microsoft.com/office/drawing/2014/main" xmlns="" id="{10BF5E5F-77CD-EC4A-99C4-D312A8B054CC}"/>
+                <a16:creationId xmlns:a16="http://schemas.microsoft.com/office/drawing/2014/main" id="{10BF5E5F-77CD-EC4A-99C4-D312A8B054CC}"/>
               </a:ext>
             </a:extLst>
           </p:cNvPr>
@@ -2772,7 +2772,7 @@
           <p:cNvPr id="7" name="Slide Number Placeholder 6">
             <a:extLst>
               <a:ext uri="{FF2B5EF4-FFF2-40B4-BE49-F238E27FC236}">
-                <a16:creationId xmlns:a16="http://schemas.microsoft.com/office/drawing/2014/main" xmlns="" id="{AC2EF572-4C36-B440-A326-07A40489CD3C}"/>
+                <a16:creationId xmlns:a16="http://schemas.microsoft.com/office/drawing/2014/main" id="{AC2EF572-4C36-B440-A326-07A40489CD3C}"/>
               </a:ext>
             </a:extLst>
           </p:cNvPr>
@@ -2831,7 +2831,7 @@
           <p:cNvPr id="2" name="Title 1">
             <a:extLst>
               <a:ext uri="{FF2B5EF4-FFF2-40B4-BE49-F238E27FC236}">
-                <a16:creationId xmlns:a16="http://schemas.microsoft.com/office/drawing/2014/main" xmlns="" id="{2FCD6FC9-3DC7-8E43-BD1C-034B48EB0DA3}"/>
+                <a16:creationId xmlns:a16="http://schemas.microsoft.com/office/drawing/2014/main" id="{2FCD6FC9-3DC7-8E43-BD1C-034B48EB0DA3}"/>
               </a:ext>
             </a:extLst>
           </p:cNvPr>
@@ -2868,7 +2868,7 @@
           <p:cNvPr id="3" name="Picture Placeholder 2">
             <a:extLst>
               <a:ext uri="{FF2B5EF4-FFF2-40B4-BE49-F238E27FC236}">
-                <a16:creationId xmlns:a16="http://schemas.microsoft.com/office/drawing/2014/main" xmlns="" id="{2A37D6B9-1A89-364B-9003-07F0BFF39EF2}"/>
+                <a16:creationId xmlns:a16="http://schemas.microsoft.com/office/drawing/2014/main" id="{2A37D6B9-1A89-364B-9003-07F0BFF39EF2}"/>
               </a:ext>
             </a:extLst>
           </p:cNvPr>
@@ -2935,7 +2935,7 @@
           <p:cNvPr id="4" name="Text Placeholder 3">
             <a:extLst>
               <a:ext uri="{FF2B5EF4-FFF2-40B4-BE49-F238E27FC236}">
-                <a16:creationId xmlns:a16="http://schemas.microsoft.com/office/drawing/2014/main" xmlns="" id="{A9509241-BDFB-6A48-9C4E-0621738C4876}"/>
+                <a16:creationId xmlns:a16="http://schemas.microsoft.com/office/drawing/2014/main" id="{A9509241-BDFB-6A48-9C4E-0621738C4876}"/>
               </a:ext>
             </a:extLst>
           </p:cNvPr>
@@ -3006,7 +3006,7 @@
           <p:cNvPr id="5" name="Date Placeholder 4">
             <a:extLst>
               <a:ext uri="{FF2B5EF4-FFF2-40B4-BE49-F238E27FC236}">
-                <a16:creationId xmlns:a16="http://schemas.microsoft.com/office/drawing/2014/main" xmlns="" id="{A4DB1247-58AE-8243-B054-5360DC13C3E6}"/>
+                <a16:creationId xmlns:a16="http://schemas.microsoft.com/office/drawing/2014/main" id="{A4DB1247-58AE-8243-B054-5360DC13C3E6}"/>
               </a:ext>
             </a:extLst>
           </p:cNvPr>
@@ -3024,7 +3024,7 @@
           <a:p>
             <a:fld id="{61D5BA3A-DD4C-6840-8061-179B7C5E8DD5}" type="datetimeFigureOut">
               <a:rPr lang="en-US" smtClean="0"/>
-              <a:t>3/25/20</a:t>
+              <a:t>4/22/20</a:t>
             </a:fld>
             <a:endParaRPr lang="en-US"/>
           </a:p>
@@ -3035,7 +3035,7 @@
           <p:cNvPr id="6" name="Footer Placeholder 5">
             <a:extLst>
               <a:ext uri="{FF2B5EF4-FFF2-40B4-BE49-F238E27FC236}">
-                <a16:creationId xmlns:a16="http://schemas.microsoft.com/office/drawing/2014/main" xmlns="" id="{0FBFF7A0-02E1-B446-9812-0024BDFA8C4D}"/>
+                <a16:creationId xmlns:a16="http://schemas.microsoft.com/office/drawing/2014/main" id="{0FBFF7A0-02E1-B446-9812-0024BDFA8C4D}"/>
               </a:ext>
             </a:extLst>
           </p:cNvPr>
@@ -3060,7 +3060,7 @@
           <p:cNvPr id="7" name="Slide Number Placeholder 6">
             <a:extLst>
               <a:ext uri="{FF2B5EF4-FFF2-40B4-BE49-F238E27FC236}">
-                <a16:creationId xmlns:a16="http://schemas.microsoft.com/office/drawing/2014/main" xmlns="" id="{5042D624-053B-DF46-91B6-A852F4BA980F}"/>
+                <a16:creationId xmlns:a16="http://schemas.microsoft.com/office/drawing/2014/main" id="{5042D624-053B-DF46-91B6-A852F4BA980F}"/>
               </a:ext>
             </a:extLst>
           </p:cNvPr>
@@ -3124,7 +3124,7 @@
           <p:cNvPr id="2" name="Title Placeholder 1">
             <a:extLst>
               <a:ext uri="{FF2B5EF4-FFF2-40B4-BE49-F238E27FC236}">
-                <a16:creationId xmlns:a16="http://schemas.microsoft.com/office/drawing/2014/main" xmlns="" id="{DD1AACBD-F6FE-D74D-B3E0-4B1874877E97}"/>
+                <a16:creationId xmlns:a16="http://schemas.microsoft.com/office/drawing/2014/main" id="{DD1AACBD-F6FE-D74D-B3E0-4B1874877E97}"/>
               </a:ext>
             </a:extLst>
           </p:cNvPr>
@@ -3162,7 +3162,7 @@
           <p:cNvPr id="3" name="Text Placeholder 2">
             <a:extLst>
               <a:ext uri="{FF2B5EF4-FFF2-40B4-BE49-F238E27FC236}">
-                <a16:creationId xmlns:a16="http://schemas.microsoft.com/office/drawing/2014/main" xmlns="" id="{C936D05F-41FA-FB45-A07D-7F9CD1B13554}"/>
+                <a16:creationId xmlns:a16="http://schemas.microsoft.com/office/drawing/2014/main" id="{C936D05F-41FA-FB45-A07D-7F9CD1B13554}"/>
               </a:ext>
             </a:extLst>
           </p:cNvPr>
@@ -3229,7 +3229,7 @@
           <p:cNvPr id="4" name="Date Placeholder 3">
             <a:extLst>
               <a:ext uri="{FF2B5EF4-FFF2-40B4-BE49-F238E27FC236}">
-                <a16:creationId xmlns:a16="http://schemas.microsoft.com/office/drawing/2014/main" xmlns="" id="{92BD93D3-E0FB-8C4E-8F28-7E5A450A0A0A}"/>
+                <a16:creationId xmlns:a16="http://schemas.microsoft.com/office/drawing/2014/main" id="{92BD93D3-E0FB-8C4E-8F28-7E5A450A0A0A}"/>
               </a:ext>
             </a:extLst>
           </p:cNvPr>
@@ -3265,7 +3265,7 @@
           <a:p>
             <a:fld id="{61D5BA3A-DD4C-6840-8061-179B7C5E8DD5}" type="datetimeFigureOut">
               <a:rPr lang="en-US" smtClean="0"/>
-              <a:t>3/25/20</a:t>
+              <a:t>4/22/20</a:t>
             </a:fld>
             <a:endParaRPr lang="en-US"/>
           </a:p>
@@ -3276,7 +3276,7 @@
           <p:cNvPr id="5" name="Footer Placeholder 4">
             <a:extLst>
               <a:ext uri="{FF2B5EF4-FFF2-40B4-BE49-F238E27FC236}">
-                <a16:creationId xmlns:a16="http://schemas.microsoft.com/office/drawing/2014/main" xmlns="" id="{13183A43-32F5-3948-921E-AC2359F42FBD}"/>
+                <a16:creationId xmlns:a16="http://schemas.microsoft.com/office/drawing/2014/main" id="{13183A43-32F5-3948-921E-AC2359F42FBD}"/>
               </a:ext>
             </a:extLst>
           </p:cNvPr>
@@ -3319,7 +3319,7 @@
           <p:cNvPr id="6" name="Slide Number Placeholder 5">
             <a:extLst>
               <a:ext uri="{FF2B5EF4-FFF2-40B4-BE49-F238E27FC236}">
-                <a16:creationId xmlns:a16="http://schemas.microsoft.com/office/drawing/2014/main" xmlns="" id="{8673B7FE-E4B7-A542-B2CE-E31DA02E3CBE}"/>
+                <a16:creationId xmlns:a16="http://schemas.microsoft.com/office/drawing/2014/main" id="{8673B7FE-E4B7-A542-B2CE-E31DA02E3CBE}"/>
               </a:ext>
             </a:extLst>
           </p:cNvPr>
@@ -3687,7 +3687,7 @@
           <p:cNvPr id="7" name="Graphic 6">
             <a:extLst>
               <a:ext uri="{FF2B5EF4-FFF2-40B4-BE49-F238E27FC236}">
-                <a16:creationId xmlns:a16="http://schemas.microsoft.com/office/drawing/2014/main" xmlns="" id="{9ABB5416-3BC5-E94C-BFAA-83764212EC25}"/>
+                <a16:creationId xmlns:a16="http://schemas.microsoft.com/office/drawing/2014/main" id="{9ABB5416-3BC5-E94C-BFAA-83764212EC25}"/>
               </a:ext>
             </a:extLst>
           </p:cNvPr>
@@ -3700,7 +3700,7 @@
           <a:blip r:embed="rId2">
             <a:extLst>
               <a:ext uri="{96DAC541-7B7A-43D3-8B79-37D633B846F1}">
-                <asvg:svgBlip xmlns:asvg="http://schemas.microsoft.com/office/drawing/2016/SVG/main" xmlns="" r:embed="rId3"/>
+                <asvg:svgBlip xmlns:asvg="http://schemas.microsoft.com/office/drawing/2016/SVG/main" r:embed="rId3"/>
               </a:ext>
             </a:extLst>
           </a:blip>
@@ -3717,47 +3717,12 @@
           </a:prstGeom>
         </p:spPr>
       </p:pic>
-      <p:pic>
-        <p:nvPicPr>
-          <p:cNvPr id="9" name="Graphic 8">
-            <a:extLst>
-              <a:ext uri="{FF2B5EF4-FFF2-40B4-BE49-F238E27FC236}">
-                <a16:creationId xmlns:a16="http://schemas.microsoft.com/office/drawing/2014/main" xmlns="" id="{130BE02D-D7C5-9D4E-8B26-14B02F982A77}"/>
-              </a:ext>
-            </a:extLst>
-          </p:cNvPr>
-          <p:cNvPicPr>
-            <a:picLocks noChangeAspect="1"/>
-          </p:cNvPicPr>
-          <p:nvPr/>
-        </p:nvPicPr>
-        <p:blipFill rotWithShape="1">
-          <a:blip r:embed="rId4">
-            <a:extLst>
-              <a:ext uri="{96DAC541-7B7A-43D3-8B79-37D633B846F1}">
-                <asvg:svgBlip xmlns:asvg="http://schemas.microsoft.com/office/drawing/2016/SVG/main" xmlns="" r:embed="rId5"/>
-              </a:ext>
-            </a:extLst>
-          </a:blip>
-          <a:srcRect l="15443" t="6386" r="2930"/>
-          <a:stretch/>
-        </p:blipFill>
-        <p:spPr>
-          <a:xfrm>
-            <a:off x="6273800" y="386746"/>
-            <a:ext cx="5642543" cy="6471254"/>
-          </a:xfrm>
-          <a:prstGeom prst="rect">
-            <a:avLst/>
-          </a:prstGeom>
-        </p:spPr>
-      </p:pic>
       <p:sp>
         <p:nvSpPr>
           <p:cNvPr id="12" name="TextBox 11">
             <a:extLst>
               <a:ext uri="{FF2B5EF4-FFF2-40B4-BE49-F238E27FC236}">
-                <a16:creationId xmlns:a16="http://schemas.microsoft.com/office/drawing/2014/main" xmlns="" id="{5C3E6C10-2305-6E46-B8CE-D2009F042578}"/>
+                <a16:creationId xmlns:a16="http://schemas.microsoft.com/office/drawing/2014/main" id="{5C3E6C10-2305-6E46-B8CE-D2009F042578}"/>
               </a:ext>
             </a:extLst>
           </p:cNvPr>
@@ -3794,7 +3759,7 @@
           <p:cNvPr id="13" name="TextBox 12">
             <a:extLst>
               <a:ext uri="{FF2B5EF4-FFF2-40B4-BE49-F238E27FC236}">
-                <a16:creationId xmlns:a16="http://schemas.microsoft.com/office/drawing/2014/main" xmlns="" id="{49E1F3BF-9F09-D748-8A47-2C500E62CFFB}"/>
+                <a16:creationId xmlns:a16="http://schemas.microsoft.com/office/drawing/2014/main" id="{49E1F3BF-9F09-D748-8A47-2C500E62CFFB}"/>
               </a:ext>
             </a:extLst>
           </p:cNvPr>
@@ -3826,6 +3791,35 @@
           </a:p>
         </p:txBody>
       </p:sp>
+      <p:pic>
+        <p:nvPicPr>
+          <p:cNvPr id="3" name="Picture 2">
+            <a:extLst>
+              <a:ext uri="{FF2B5EF4-FFF2-40B4-BE49-F238E27FC236}">
+                <a16:creationId xmlns:a16="http://schemas.microsoft.com/office/drawing/2014/main" id="{FA03FEAC-F654-1847-BB1C-71B1DD2CB09A}"/>
+              </a:ext>
+            </a:extLst>
+          </p:cNvPr>
+          <p:cNvPicPr>
+            <a:picLocks noChangeAspect="1"/>
+          </p:cNvPicPr>
+          <p:nvPr/>
+        </p:nvPicPr>
+        <p:blipFill rotWithShape="1">
+          <a:blip r:embed="rId4"/>
+          <a:srcRect l="15211" t="5694"/>
+          <a:stretch/>
+        </p:blipFill>
+        <p:spPr>
+          <a:xfrm>
+            <a:off x="6579476" y="287147"/>
+            <a:ext cx="5814848" cy="6467513"/>
+          </a:xfrm>
+          <a:prstGeom prst="rect">
+            <a:avLst/>
+          </a:prstGeom>
+        </p:spPr>
+      </p:pic>
     </p:spTree>
     <p:extLst>
       <p:ext uri="{BB962C8B-B14F-4D97-AF65-F5344CB8AC3E}">
@@ -3861,7 +3855,7 @@
           <p:cNvPr id="4" name="Picture 3">
             <a:extLst>
               <a:ext uri="{FF2B5EF4-FFF2-40B4-BE49-F238E27FC236}">
-                <a16:creationId xmlns:a16="http://schemas.microsoft.com/office/drawing/2014/main" xmlns="" id="{90FE2568-4799-B142-BBE5-836EDA71AC2D}"/>
+                <a16:creationId xmlns:a16="http://schemas.microsoft.com/office/drawing/2014/main" id="{90FE2568-4799-B142-BBE5-836EDA71AC2D}"/>
               </a:ext>
             </a:extLst>
           </p:cNvPr>
@@ -3890,7 +3884,7 @@
           <p:cNvPr id="5" name="Graphic 8">
             <a:extLst>
               <a:ext uri="{FF2B5EF4-FFF2-40B4-BE49-F238E27FC236}">
-                <a16:creationId xmlns:a16="http://schemas.microsoft.com/office/drawing/2014/main" xmlns="" id="{D42D8629-43DD-B04A-9DA6-1EB35DDAC06C}"/>
+                <a16:creationId xmlns:a16="http://schemas.microsoft.com/office/drawing/2014/main" id="{D42D8629-43DD-B04A-9DA6-1EB35DDAC06C}"/>
               </a:ext>
             </a:extLst>
           </p:cNvPr>
@@ -3903,7 +3897,7 @@
           <a:blip r:embed="rId3">
             <a:extLst>
               <a:ext uri="{96DAC541-7B7A-43D3-8B79-37D633B846F1}">
-                <asvg:svgBlip xmlns:asvg="http://schemas.microsoft.com/office/drawing/2016/SVG/main" xmlns="" r:embed="rId5"/>
+                <asvg:svgBlip xmlns:asvg="http://schemas.microsoft.com/office/drawing/2016/SVG/main" r:embed="rId4"/>
               </a:ext>
             </a:extLst>
           </a:blip>
@@ -3925,7 +3919,7 @@
           <p:cNvPr id="6" name="TextBox 5">
             <a:extLst>
               <a:ext uri="{FF2B5EF4-FFF2-40B4-BE49-F238E27FC236}">
-                <a16:creationId xmlns:a16="http://schemas.microsoft.com/office/drawing/2014/main" xmlns="" id="{5C3E6C10-2305-6E46-B8CE-D2009F042578}"/>
+                <a16:creationId xmlns:a16="http://schemas.microsoft.com/office/drawing/2014/main" id="{5C3E6C10-2305-6E46-B8CE-D2009F042578}"/>
               </a:ext>
             </a:extLst>
           </p:cNvPr>
@@ -3962,7 +3956,7 @@
           <p:cNvPr id="7" name="TextBox 6">
             <a:extLst>
               <a:ext uri="{FF2B5EF4-FFF2-40B4-BE49-F238E27FC236}">
-                <a16:creationId xmlns:a16="http://schemas.microsoft.com/office/drawing/2014/main" xmlns="" id="{49E1F3BF-9F09-D748-8A47-2C500E62CFFB}"/>
+                <a16:creationId xmlns:a16="http://schemas.microsoft.com/office/drawing/2014/main" id="{49E1F3BF-9F09-D748-8A47-2C500E62CFFB}"/>
               </a:ext>
             </a:extLst>
           </p:cNvPr>
@@ -4029,7 +4023,7 @@
           <p:cNvPr id="9" name="Graphic 8">
             <a:extLst>
               <a:ext uri="{FF2B5EF4-FFF2-40B4-BE49-F238E27FC236}">
-                <a16:creationId xmlns:a16="http://schemas.microsoft.com/office/drawing/2014/main" xmlns="" id="{75141C39-6CE5-1642-A6C3-FE5BB6E66E05}"/>
+                <a16:creationId xmlns:a16="http://schemas.microsoft.com/office/drawing/2014/main" id="{75141C39-6CE5-1642-A6C3-FE5BB6E66E05}"/>
               </a:ext>
             </a:extLst>
           </p:cNvPr>
@@ -4042,7 +4036,7 @@
           <a:blip r:embed="rId2">
             <a:extLst>
               <a:ext uri="{96DAC541-7B7A-43D3-8B79-37D633B846F1}">
-                <asvg:svgBlip xmlns:asvg="http://schemas.microsoft.com/office/drawing/2016/SVG/main" xmlns="" r:embed="rId5"/>
+                <asvg:svgBlip xmlns:asvg="http://schemas.microsoft.com/office/drawing/2016/SVG/main" r:embed="rId3"/>
               </a:ext>
             </a:extLst>
           </a:blip>
@@ -4064,7 +4058,7 @@
           <p:cNvPr id="10" name="TextBox 9">
             <a:extLst>
               <a:ext uri="{FF2B5EF4-FFF2-40B4-BE49-F238E27FC236}">
-                <a16:creationId xmlns:a16="http://schemas.microsoft.com/office/drawing/2014/main" xmlns="" id="{BBBFFBA9-E8A3-024A-8076-537C5357F6FB}"/>
+                <a16:creationId xmlns:a16="http://schemas.microsoft.com/office/drawing/2014/main" id="{BBBFFBA9-E8A3-024A-8076-537C5357F6FB}"/>
               </a:ext>
             </a:extLst>
           </p:cNvPr>
@@ -4101,7 +4095,7 @@
           <p:cNvPr id="11" name="TextBox 10">
             <a:extLst>
               <a:ext uri="{FF2B5EF4-FFF2-40B4-BE49-F238E27FC236}">
-                <a16:creationId xmlns:a16="http://schemas.microsoft.com/office/drawing/2014/main" xmlns="" id="{AE750F63-E421-7041-ADE4-8857C715E3AF}"/>
+                <a16:creationId xmlns:a16="http://schemas.microsoft.com/office/drawing/2014/main" id="{AE750F63-E421-7041-ADE4-8857C715E3AF}"/>
               </a:ext>
             </a:extLst>
           </p:cNvPr>
@@ -4138,7 +4132,7 @@
           <p:cNvPr id="16" name="Picture 15">
             <a:extLst>
               <a:ext uri="{FF2B5EF4-FFF2-40B4-BE49-F238E27FC236}">
-                <a16:creationId xmlns:a16="http://schemas.microsoft.com/office/drawing/2014/main" xmlns="" id="{6849E4E5-AA5A-CD41-91A5-915F1E5AE807}"/>
+                <a16:creationId xmlns:a16="http://schemas.microsoft.com/office/drawing/2014/main" id="{6849E4E5-AA5A-CD41-91A5-915F1E5AE807}"/>
               </a:ext>
             </a:extLst>
           </p:cNvPr>
@@ -4148,7 +4142,7 @@
           <p:nvPr/>
         </p:nvPicPr>
         <p:blipFill rotWithShape="1">
-          <a:blip r:embed="rId6"/>
+          <a:blip r:embed="rId4"/>
           <a:srcRect l="15878" t="6881"/>
           <a:stretch/>
         </p:blipFill>
@@ -4197,7 +4191,7 @@
           <p:cNvPr id="5" name="Graphic 4">
             <a:extLst>
               <a:ext uri="{FF2B5EF4-FFF2-40B4-BE49-F238E27FC236}">
-                <a16:creationId xmlns:a16="http://schemas.microsoft.com/office/drawing/2014/main" xmlns="" id="{115AC61F-94CD-6944-8F5C-FDA30534205C}"/>
+                <a16:creationId xmlns:a16="http://schemas.microsoft.com/office/drawing/2014/main" id="{115AC61F-94CD-6944-8F5C-FDA30534205C}"/>
               </a:ext>
             </a:extLst>
           </p:cNvPr>
@@ -4210,7 +4204,7 @@
           <a:blip r:embed="rId2">
             <a:extLst>
               <a:ext uri="{96DAC541-7B7A-43D3-8B79-37D633B846F1}">
-                <asvg:svgBlip xmlns:asvg="http://schemas.microsoft.com/office/drawing/2016/SVG/main" xmlns="" r:embed="rId3"/>
+                <asvg:svgBlip xmlns:asvg="http://schemas.microsoft.com/office/drawing/2016/SVG/main" r:embed="rId3"/>
               </a:ext>
             </a:extLst>
           </a:blip>
@@ -4232,7 +4226,7 @@
           <p:cNvPr id="14" name="TextBox 13">
             <a:extLst>
               <a:ext uri="{FF2B5EF4-FFF2-40B4-BE49-F238E27FC236}">
-                <a16:creationId xmlns:a16="http://schemas.microsoft.com/office/drawing/2014/main" xmlns="" id="{C5454FB1-F963-2C42-96AC-48F12C2C911F}"/>
+                <a16:creationId xmlns:a16="http://schemas.microsoft.com/office/drawing/2014/main" id="{C5454FB1-F963-2C42-96AC-48F12C2C911F}"/>
               </a:ext>
             </a:extLst>
           </p:cNvPr>
@@ -4260,43 +4254,6 @@
                 <a:latin typeface="Helvetica" pitchFamily="2" charset="0"/>
               </a:rPr>
               <a:t>a)</a:t>
-            </a:r>
-          </a:p>
-        </p:txBody>
-      </p:sp>
-      <p:sp>
-        <p:nvSpPr>
-          <p:cNvPr id="15" name="TextBox 14">
-            <a:extLst>
-              <a:ext uri="{FF2B5EF4-FFF2-40B4-BE49-F238E27FC236}">
-                <a16:creationId xmlns:a16="http://schemas.microsoft.com/office/drawing/2014/main" xmlns="" id="{B93B9E3E-FC54-0D42-BD4C-559D4D2AF6D4}"/>
-              </a:ext>
-            </a:extLst>
-          </p:cNvPr>
-          <p:cNvSpPr txBox="1"/>
-          <p:nvPr/>
-        </p:nvSpPr>
-        <p:spPr>
-          <a:xfrm>
-            <a:off x="3947605" y="699974"/>
-            <a:ext cx="389850" cy="307777"/>
-          </a:xfrm>
-          <a:prstGeom prst="rect">
-            <a:avLst/>
-          </a:prstGeom>
-          <a:noFill/>
-        </p:spPr>
-        <p:txBody>
-          <a:bodyPr wrap="square" rtlCol="0">
-            <a:spAutoFit/>
-          </a:bodyPr>
-          <a:lstStyle/>
-          <a:p>
-            <a:r>
-              <a:rPr lang="en-US" sz="1400" dirty="0">
-                <a:latin typeface="Helvetica" pitchFamily="2" charset="0"/>
-              </a:rPr>
-              <a:t>b)</a:t>
             </a:r>
           </a:p>
         </p:txBody>
@@ -4335,7 +4292,7 @@
           <p:cNvPr id="10" name="TextBox 9">
             <a:extLst>
               <a:ext uri="{FF2B5EF4-FFF2-40B4-BE49-F238E27FC236}">
-                <a16:creationId xmlns:a16="http://schemas.microsoft.com/office/drawing/2014/main" xmlns="" id="{C5454FB1-F963-2C42-96AC-48F12C2C911F}"/>
+                <a16:creationId xmlns:a16="http://schemas.microsoft.com/office/drawing/2014/main" id="{C5454FB1-F963-2C42-96AC-48F12C2C911F}"/>
               </a:ext>
             </a:extLst>
           </p:cNvPr>
@@ -4362,17 +4319,8 @@
               <a:rPr lang="en-US" sz="1400" dirty="0">
                 <a:latin typeface="Helvetica" pitchFamily="2" charset="0"/>
               </a:rPr>
-              <a:t>b</a:t>
-            </a:r>
-            <a:r>
-              <a:rPr lang="en-US" sz="1400" dirty="0" smtClean="0">
-                <a:latin typeface="Helvetica" pitchFamily="2" charset="0"/>
-              </a:rPr>
-              <a:t>)</a:t>
-            </a:r>
-            <a:endParaRPr lang="en-US" sz="1400" dirty="0">
-              <a:latin typeface="Helvetica" pitchFamily="2" charset="0"/>
-            </a:endParaRPr>
+              <a:t>b)</a:t>
+            </a:r>
           </a:p>
         </p:txBody>
       </p:sp>
@@ -4380,6 +4328,174 @@
     <p:extLst>
       <p:ext uri="{BB962C8B-B14F-4D97-AF65-F5344CB8AC3E}">
         <p14:creationId xmlns:p14="http://schemas.microsoft.com/office/powerpoint/2010/main" val="3679662612"/>
+      </p:ext>
+    </p:extLst>
+  </p:cSld>
+  <p:clrMapOvr>
+    <a:masterClrMapping/>
+  </p:clrMapOvr>
+</p:sld>
+</file>
+
+<file path=ppt/slides/slide5.xml><?xml version="1.0" encoding="utf-8"?>
+<p:sld xmlns:a="http://schemas.openxmlformats.org/drawingml/2006/main" xmlns:r="http://schemas.openxmlformats.org/officeDocument/2006/relationships" xmlns:p="http://schemas.openxmlformats.org/presentationml/2006/main">
+  <p:cSld>
+    <p:spTree>
+      <p:nvGrpSpPr>
+        <p:cNvPr id="1" name=""/>
+        <p:cNvGrpSpPr/>
+        <p:nvPr/>
+      </p:nvGrpSpPr>
+      <p:grpSpPr>
+        <a:xfrm>
+          <a:off x="0" y="0"/>
+          <a:ext cx="0" cy="0"/>
+          <a:chOff x="0" y="0"/>
+          <a:chExt cx="0" cy="0"/>
+        </a:xfrm>
+      </p:grpSpPr>
+      <p:pic>
+        <p:nvPicPr>
+          <p:cNvPr id="5" name="Graphic 4">
+            <a:extLst>
+              <a:ext uri="{FF2B5EF4-FFF2-40B4-BE49-F238E27FC236}">
+                <a16:creationId xmlns:a16="http://schemas.microsoft.com/office/drawing/2014/main" id="{115AC61F-94CD-6944-8F5C-FDA30534205C}"/>
+              </a:ext>
+            </a:extLst>
+          </p:cNvPr>
+          <p:cNvPicPr>
+            <a:picLocks noChangeAspect="1"/>
+          </p:cNvPicPr>
+          <p:nvPr/>
+        </p:nvPicPr>
+        <p:blipFill rotWithShape="1">
+          <a:blip r:embed="rId2">
+            <a:extLst>
+              <a:ext uri="{96DAC541-7B7A-43D3-8B79-37D633B846F1}">
+                <asvg:svgBlip xmlns:asvg="http://schemas.microsoft.com/office/drawing/2016/SVG/main" r:embed="rId3"/>
+              </a:ext>
+            </a:extLst>
+          </a:blip>
+          <a:srcRect l="2037" t="6864" r="24221"/>
+          <a:stretch/>
+        </p:blipFill>
+        <p:spPr>
+          <a:xfrm>
+            <a:off x="262759" y="393192"/>
+            <a:ext cx="5118538" cy="6464808"/>
+          </a:xfrm>
+          <a:prstGeom prst="rect">
+            <a:avLst/>
+          </a:prstGeom>
+        </p:spPr>
+      </p:pic>
+      <p:sp>
+        <p:nvSpPr>
+          <p:cNvPr id="14" name="TextBox 13">
+            <a:extLst>
+              <a:ext uri="{FF2B5EF4-FFF2-40B4-BE49-F238E27FC236}">
+                <a16:creationId xmlns:a16="http://schemas.microsoft.com/office/drawing/2014/main" id="{C5454FB1-F963-2C42-96AC-48F12C2C911F}"/>
+              </a:ext>
+            </a:extLst>
+          </p:cNvPr>
+          <p:cNvSpPr txBox="1"/>
+          <p:nvPr/>
+        </p:nvSpPr>
+        <p:spPr>
+          <a:xfrm>
+            <a:off x="967285" y="85415"/>
+            <a:ext cx="389850" cy="307777"/>
+          </a:xfrm>
+          <a:prstGeom prst="rect">
+            <a:avLst/>
+          </a:prstGeom>
+          <a:noFill/>
+        </p:spPr>
+        <p:txBody>
+          <a:bodyPr wrap="square" rtlCol="0">
+            <a:spAutoFit/>
+          </a:bodyPr>
+          <a:lstStyle/>
+          <a:p>
+            <a:r>
+              <a:rPr lang="en-US" sz="1400" dirty="0">
+                <a:latin typeface="Helvetica" pitchFamily="2" charset="0"/>
+              </a:rPr>
+              <a:t>a)</a:t>
+            </a:r>
+          </a:p>
+        </p:txBody>
+      </p:sp>
+      <p:sp>
+        <p:nvSpPr>
+          <p:cNvPr id="10" name="TextBox 9">
+            <a:extLst>
+              <a:ext uri="{FF2B5EF4-FFF2-40B4-BE49-F238E27FC236}">
+                <a16:creationId xmlns:a16="http://schemas.microsoft.com/office/drawing/2014/main" id="{C5454FB1-F963-2C42-96AC-48F12C2C911F}"/>
+              </a:ext>
+            </a:extLst>
+          </p:cNvPr>
+          <p:cNvSpPr txBox="1"/>
+          <p:nvPr/>
+        </p:nvSpPr>
+        <p:spPr>
+          <a:xfrm>
+            <a:off x="5816044" y="85415"/>
+            <a:ext cx="389850" cy="307777"/>
+          </a:xfrm>
+          <a:prstGeom prst="rect">
+            <a:avLst/>
+          </a:prstGeom>
+          <a:noFill/>
+        </p:spPr>
+        <p:txBody>
+          <a:bodyPr wrap="square" rtlCol="0">
+            <a:spAutoFit/>
+          </a:bodyPr>
+          <a:lstStyle/>
+          <a:p>
+            <a:r>
+              <a:rPr lang="en-US" sz="1400" dirty="0">
+                <a:latin typeface="Helvetica" pitchFamily="2" charset="0"/>
+              </a:rPr>
+              <a:t>b)</a:t>
+            </a:r>
+          </a:p>
+        </p:txBody>
+      </p:sp>
+      <p:pic>
+        <p:nvPicPr>
+          <p:cNvPr id="4" name="Picture 3">
+            <a:extLst>
+              <a:ext uri="{FF2B5EF4-FFF2-40B4-BE49-F238E27FC236}">
+                <a16:creationId xmlns:a16="http://schemas.microsoft.com/office/drawing/2014/main" id="{AD4DD237-35F9-3F41-8E10-D42E7E7761D8}"/>
+              </a:ext>
+            </a:extLst>
+          </p:cNvPr>
+          <p:cNvPicPr>
+            <a:picLocks noChangeAspect="1"/>
+          </p:cNvPicPr>
+          <p:nvPr/>
+        </p:nvPicPr>
+        <p:blipFill rotWithShape="1">
+          <a:blip r:embed="rId4"/>
+          <a:srcRect l="15949" t="5733"/>
+          <a:stretch/>
+        </p:blipFill>
+        <p:spPr>
+          <a:xfrm>
+            <a:off x="6085823" y="393191"/>
+            <a:ext cx="5764194" cy="6464809"/>
+          </a:xfrm>
+          <a:prstGeom prst="rect">
+            <a:avLst/>
+          </a:prstGeom>
+        </p:spPr>
+      </p:pic>
+    </p:spTree>
+    <p:extLst>
+      <p:ext uri="{BB962C8B-B14F-4D97-AF65-F5344CB8AC3E}">
+        <p14:creationId xmlns:p14="http://schemas.microsoft.com/office/powerpoint/2010/main" val="1014089461"/>
       </p:ext>
     </p:extLst>
   </p:cSld>

</xml_diff>

<commit_message>
forgot to push old edits
</commit_message>
<xml_diff>
--- a/analyses/figures/muplotextras/muplotprep.pptx
+++ b/analyses/figures/muplotextras/muplotprep.pptx
@@ -5,7 +5,7 @@
     <p:sldMasterId id="2147483648" r:id="rId1"/>
   </p:sldMasterIdLst>
   <p:notesMasterIdLst>
-    <p:notesMasterId r:id="rId7"/>
+    <p:notesMasterId r:id="rId11"/>
   </p:notesMasterIdLst>
   <p:sldIdLst>
     <p:sldId id="256" r:id="rId2"/>
@@ -13,6 +13,10 @@
     <p:sldId id="257" r:id="rId4"/>
     <p:sldId id="258" r:id="rId5"/>
     <p:sldId id="261" r:id="rId6"/>
+    <p:sldId id="263" r:id="rId7"/>
+    <p:sldId id="264" r:id="rId8"/>
+    <p:sldId id="265" r:id="rId9"/>
+    <p:sldId id="266" r:id="rId10"/>
   </p:sldIdLst>
   <p:sldSz cx="12192000" cy="6858000"/>
   <p:notesSz cx="6858000" cy="9144000"/>
@@ -201,7 +205,7 @@
           <a:p>
             <a:fld id="{50109146-7479-554D-95AE-0AFDDADBF6E9}" type="datetimeFigureOut">
               <a:rPr lang="en-US" smtClean="0"/>
-              <a:t>4/22/20</a:t>
+              <a:t>6/17/20</a:t>
             </a:fld>
             <a:endParaRPr lang="en-US"/>
           </a:p>
@@ -468,6 +472,90 @@
 </p:notesMaster>
 </file>
 
+<file path=ppt/notesSlides/notesSlide1.xml><?xml version="1.0" encoding="utf-8"?>
+<p:notes xmlns:a="http://schemas.openxmlformats.org/drawingml/2006/main" xmlns:r="http://schemas.openxmlformats.org/officeDocument/2006/relationships" xmlns:p="http://schemas.openxmlformats.org/presentationml/2006/main">
+  <p:cSld>
+    <p:spTree>
+      <p:nvGrpSpPr>
+        <p:cNvPr id="1" name=""/>
+        <p:cNvGrpSpPr/>
+        <p:nvPr/>
+      </p:nvGrpSpPr>
+      <p:grpSpPr>
+        <a:xfrm>
+          <a:off x="0" y="0"/>
+          <a:ext cx="0" cy="0"/>
+          <a:chOff x="0" y="0"/>
+          <a:chExt cx="0" cy="0"/>
+        </a:xfrm>
+      </p:grpSpPr>
+      <p:sp>
+        <p:nvSpPr>
+          <p:cNvPr id="2" name="Slide Image Placeholder 1"/>
+          <p:cNvSpPr>
+            <a:spLocks noGrp="1" noRot="1" noChangeAspect="1"/>
+          </p:cNvSpPr>
+          <p:nvPr>
+            <p:ph type="sldImg"/>
+          </p:nvPr>
+        </p:nvSpPr>
+        <p:spPr/>
+      </p:sp>
+      <p:sp>
+        <p:nvSpPr>
+          <p:cNvPr id="3" name="Notes Placeholder 2"/>
+          <p:cNvSpPr>
+            <a:spLocks noGrp="1"/>
+          </p:cNvSpPr>
+          <p:nvPr>
+            <p:ph type="body" idx="1"/>
+          </p:nvPr>
+        </p:nvSpPr>
+        <p:spPr/>
+        <p:txBody>
+          <a:bodyPr/>
+          <a:lstStyle/>
+          <a:p>
+            <a:endParaRPr lang="en-US" dirty="0"/>
+          </a:p>
+        </p:txBody>
+      </p:sp>
+      <p:sp>
+        <p:nvSpPr>
+          <p:cNvPr id="4" name="Slide Number Placeholder 3"/>
+          <p:cNvSpPr>
+            <a:spLocks noGrp="1"/>
+          </p:cNvSpPr>
+          <p:nvPr>
+            <p:ph type="sldNum" sz="quarter" idx="5"/>
+          </p:nvPr>
+        </p:nvSpPr>
+        <p:spPr/>
+        <p:txBody>
+          <a:bodyPr/>
+          <a:lstStyle/>
+          <a:p>
+            <a:fld id="{CEB6A80D-3228-3343-94CC-F7DBC408B143}" type="slidenum">
+              <a:rPr lang="en-US" smtClean="0"/>
+              <a:t>7</a:t>
+            </a:fld>
+            <a:endParaRPr lang="en-US"/>
+          </a:p>
+        </p:txBody>
+      </p:sp>
+    </p:spTree>
+    <p:extLst>
+      <p:ext uri="{BB962C8B-B14F-4D97-AF65-F5344CB8AC3E}">
+        <p14:creationId xmlns:p14="http://schemas.microsoft.com/office/powerpoint/2010/main" val="1789787917"/>
+      </p:ext>
+    </p:extLst>
+  </p:cSld>
+  <p:clrMapOvr>
+    <a:masterClrMapping/>
+  </p:clrMapOvr>
+</p:notes>
+</file>
+
 <file path=ppt/slideLayouts/slideLayout1.xml><?xml version="1.0" encoding="utf-8"?>
 <p:sldLayout xmlns:a="http://schemas.openxmlformats.org/drawingml/2006/main" xmlns:r="http://schemas.openxmlformats.org/officeDocument/2006/relationships" xmlns:p="http://schemas.openxmlformats.org/presentationml/2006/main" type="title" preserve="1">
   <p:cSld name="Title Slide">
@@ -615,7 +703,7 @@
           <a:p>
             <a:fld id="{61D5BA3A-DD4C-6840-8061-179B7C5E8DD5}" type="datetimeFigureOut">
               <a:rPr lang="en-US" smtClean="0"/>
-              <a:t>4/22/20</a:t>
+              <a:t>6/17/20</a:t>
             </a:fld>
             <a:endParaRPr lang="en-US"/>
           </a:p>
@@ -813,7 +901,7 @@
           <a:p>
             <a:fld id="{61D5BA3A-DD4C-6840-8061-179B7C5E8DD5}" type="datetimeFigureOut">
               <a:rPr lang="en-US" smtClean="0"/>
-              <a:t>4/22/20</a:t>
+              <a:t>6/17/20</a:t>
             </a:fld>
             <a:endParaRPr lang="en-US"/>
           </a:p>
@@ -1021,7 +1109,7 @@
           <a:p>
             <a:fld id="{61D5BA3A-DD4C-6840-8061-179B7C5E8DD5}" type="datetimeFigureOut">
               <a:rPr lang="en-US" smtClean="0"/>
-              <a:t>4/22/20</a:t>
+              <a:t>6/17/20</a:t>
             </a:fld>
             <a:endParaRPr lang="en-US"/>
           </a:p>
@@ -1219,7 +1307,7 @@
           <a:p>
             <a:fld id="{61D5BA3A-DD4C-6840-8061-179B7C5E8DD5}" type="datetimeFigureOut">
               <a:rPr lang="en-US" smtClean="0"/>
-              <a:t>4/22/20</a:t>
+              <a:t>6/17/20</a:t>
             </a:fld>
             <a:endParaRPr lang="en-US"/>
           </a:p>
@@ -1494,7 +1582,7 @@
           <a:p>
             <a:fld id="{61D5BA3A-DD4C-6840-8061-179B7C5E8DD5}" type="datetimeFigureOut">
               <a:rPr lang="en-US" smtClean="0"/>
-              <a:t>4/22/20</a:t>
+              <a:t>6/17/20</a:t>
             </a:fld>
             <a:endParaRPr lang="en-US"/>
           </a:p>
@@ -1759,7 +1847,7 @@
           <a:p>
             <a:fld id="{61D5BA3A-DD4C-6840-8061-179B7C5E8DD5}" type="datetimeFigureOut">
               <a:rPr lang="en-US" smtClean="0"/>
-              <a:t>4/22/20</a:t>
+              <a:t>6/17/20</a:t>
             </a:fld>
             <a:endParaRPr lang="en-US"/>
           </a:p>
@@ -2171,7 +2259,7 @@
           <a:p>
             <a:fld id="{61D5BA3A-DD4C-6840-8061-179B7C5E8DD5}" type="datetimeFigureOut">
               <a:rPr lang="en-US" smtClean="0"/>
-              <a:t>4/22/20</a:t>
+              <a:t>6/17/20</a:t>
             </a:fld>
             <a:endParaRPr lang="en-US"/>
           </a:p>
@@ -2312,7 +2400,7 @@
           <a:p>
             <a:fld id="{61D5BA3A-DD4C-6840-8061-179B7C5E8DD5}" type="datetimeFigureOut">
               <a:rPr lang="en-US" smtClean="0"/>
-              <a:t>4/22/20</a:t>
+              <a:t>6/17/20</a:t>
             </a:fld>
             <a:endParaRPr lang="en-US"/>
           </a:p>
@@ -2425,7 +2513,7 @@
           <a:p>
             <a:fld id="{61D5BA3A-DD4C-6840-8061-179B7C5E8DD5}" type="datetimeFigureOut">
               <a:rPr lang="en-US" smtClean="0"/>
-              <a:t>4/22/20</a:t>
+              <a:t>6/17/20</a:t>
             </a:fld>
             <a:endParaRPr lang="en-US"/>
           </a:p>
@@ -2736,7 +2824,7 @@
           <a:p>
             <a:fld id="{61D5BA3A-DD4C-6840-8061-179B7C5E8DD5}" type="datetimeFigureOut">
               <a:rPr lang="en-US" smtClean="0"/>
-              <a:t>4/22/20</a:t>
+              <a:t>6/17/20</a:t>
             </a:fld>
             <a:endParaRPr lang="en-US"/>
           </a:p>
@@ -3024,7 +3112,7 @@
           <a:p>
             <a:fld id="{61D5BA3A-DD4C-6840-8061-179B7C5E8DD5}" type="datetimeFigureOut">
               <a:rPr lang="en-US" smtClean="0"/>
-              <a:t>4/22/20</a:t>
+              <a:t>6/17/20</a:t>
             </a:fld>
             <a:endParaRPr lang="en-US"/>
           </a:p>
@@ -3265,7 +3353,7 @@
           <a:p>
             <a:fld id="{61D5BA3A-DD4C-6840-8061-179B7C5E8DD5}" type="datetimeFigureOut">
               <a:rPr lang="en-US" smtClean="0"/>
-              <a:t>4/22/20</a:t>
+              <a:t>6/17/20</a:t>
             </a:fld>
             <a:endParaRPr lang="en-US"/>
           </a:p>
@@ -4496,6 +4584,654 @@
     <p:extLst>
       <p:ext uri="{BB962C8B-B14F-4D97-AF65-F5344CB8AC3E}">
         <p14:creationId xmlns:p14="http://schemas.microsoft.com/office/powerpoint/2010/main" val="1014089461"/>
+      </p:ext>
+    </p:extLst>
+  </p:cSld>
+  <p:clrMapOvr>
+    <a:masterClrMapping/>
+  </p:clrMapOvr>
+</p:sld>
+</file>
+
+<file path=ppt/slides/slide6.xml><?xml version="1.0" encoding="utf-8"?>
+<p:sld xmlns:a="http://schemas.openxmlformats.org/drawingml/2006/main" xmlns:r="http://schemas.openxmlformats.org/officeDocument/2006/relationships" xmlns:p="http://schemas.openxmlformats.org/presentationml/2006/main">
+  <p:cSld>
+    <p:spTree>
+      <p:nvGrpSpPr>
+        <p:cNvPr id="1" name=""/>
+        <p:cNvGrpSpPr/>
+        <p:nvPr/>
+      </p:nvGrpSpPr>
+      <p:grpSpPr>
+        <a:xfrm>
+          <a:off x="0" y="0"/>
+          <a:ext cx="0" cy="0"/>
+          <a:chOff x="0" y="0"/>
+          <a:chExt cx="0" cy="0"/>
+        </a:xfrm>
+      </p:grpSpPr>
+      <p:sp>
+        <p:nvSpPr>
+          <p:cNvPr id="12" name="TextBox 11">
+            <a:extLst>
+              <a:ext uri="{FF2B5EF4-FFF2-40B4-BE49-F238E27FC236}">
+                <a16:creationId xmlns:a16="http://schemas.microsoft.com/office/drawing/2014/main" id="{5C3E6C10-2305-6E46-B8CE-D2009F042578}"/>
+              </a:ext>
+            </a:extLst>
+          </p:cNvPr>
+          <p:cNvSpPr txBox="1"/>
+          <p:nvPr/>
+        </p:nvSpPr>
+        <p:spPr>
+          <a:xfrm>
+            <a:off x="436332" y="103340"/>
+            <a:ext cx="389850" cy="307777"/>
+          </a:xfrm>
+          <a:prstGeom prst="rect">
+            <a:avLst/>
+          </a:prstGeom>
+          <a:noFill/>
+        </p:spPr>
+        <p:txBody>
+          <a:bodyPr wrap="square" rtlCol="0">
+            <a:spAutoFit/>
+          </a:bodyPr>
+          <a:lstStyle/>
+          <a:p>
+            <a:r>
+              <a:rPr lang="en-US" sz="1400" dirty="0">
+                <a:latin typeface="Helvetica" pitchFamily="2" charset="0"/>
+              </a:rPr>
+              <a:t>a)</a:t>
+            </a:r>
+          </a:p>
+        </p:txBody>
+      </p:sp>
+      <p:sp>
+        <p:nvSpPr>
+          <p:cNvPr id="13" name="TextBox 12">
+            <a:extLst>
+              <a:ext uri="{FF2B5EF4-FFF2-40B4-BE49-F238E27FC236}">
+                <a16:creationId xmlns:a16="http://schemas.microsoft.com/office/drawing/2014/main" id="{49E1F3BF-9F09-D748-8A47-2C500E62CFFB}"/>
+              </a:ext>
+            </a:extLst>
+          </p:cNvPr>
+          <p:cNvSpPr txBox="1"/>
+          <p:nvPr/>
+        </p:nvSpPr>
+        <p:spPr>
+          <a:xfrm>
+            <a:off x="6078875" y="103339"/>
+            <a:ext cx="389850" cy="307777"/>
+          </a:xfrm>
+          <a:prstGeom prst="rect">
+            <a:avLst/>
+          </a:prstGeom>
+          <a:noFill/>
+        </p:spPr>
+        <p:txBody>
+          <a:bodyPr wrap="square" rtlCol="0">
+            <a:spAutoFit/>
+          </a:bodyPr>
+          <a:lstStyle/>
+          <a:p>
+            <a:r>
+              <a:rPr lang="en-US" sz="1400" dirty="0">
+                <a:latin typeface="Helvetica" pitchFamily="2" charset="0"/>
+              </a:rPr>
+              <a:t>b)</a:t>
+            </a:r>
+          </a:p>
+        </p:txBody>
+      </p:sp>
+      <p:pic>
+        <p:nvPicPr>
+          <p:cNvPr id="6" name="Picture 5">
+            <a:extLst>
+              <a:ext uri="{FF2B5EF4-FFF2-40B4-BE49-F238E27FC236}">
+                <a16:creationId xmlns:a16="http://schemas.microsoft.com/office/drawing/2014/main" id="{C6BE68FE-94A0-BA4F-9FD6-1946E7441436}"/>
+              </a:ext>
+            </a:extLst>
+          </p:cNvPr>
+          <p:cNvPicPr>
+            <a:picLocks noChangeAspect="1"/>
+          </p:cNvPicPr>
+          <p:nvPr/>
+        </p:nvPicPr>
+        <p:blipFill rotWithShape="1">
+          <a:blip r:embed="rId2"/>
+          <a:srcRect t="6528" r="24219"/>
+          <a:stretch/>
+        </p:blipFill>
+        <p:spPr>
+          <a:xfrm>
+            <a:off x="191403" y="393192"/>
+            <a:ext cx="5241166" cy="6464808"/>
+          </a:xfrm>
+          <a:prstGeom prst="rect">
+            <a:avLst/>
+          </a:prstGeom>
+        </p:spPr>
+      </p:pic>
+      <p:pic>
+        <p:nvPicPr>
+          <p:cNvPr id="9" name="Picture 8">
+            <a:extLst>
+              <a:ext uri="{FF2B5EF4-FFF2-40B4-BE49-F238E27FC236}">
+                <a16:creationId xmlns:a16="http://schemas.microsoft.com/office/drawing/2014/main" id="{CB57661E-D859-FD4D-9AD3-C55B6C48E1A8}"/>
+              </a:ext>
+            </a:extLst>
+          </p:cNvPr>
+          <p:cNvPicPr>
+            <a:picLocks noChangeAspect="1"/>
+          </p:cNvPicPr>
+          <p:nvPr/>
+        </p:nvPicPr>
+        <p:blipFill rotWithShape="1">
+          <a:blip r:embed="rId3"/>
+          <a:srcRect l="3254" t="5994"/>
+          <a:stretch/>
+        </p:blipFill>
+        <p:spPr>
+          <a:xfrm>
+            <a:off x="5677498" y="393192"/>
+            <a:ext cx="6653290" cy="6464808"/>
+          </a:xfrm>
+          <a:prstGeom prst="rect">
+            <a:avLst/>
+          </a:prstGeom>
+        </p:spPr>
+      </p:pic>
+    </p:spTree>
+    <p:extLst>
+      <p:ext uri="{BB962C8B-B14F-4D97-AF65-F5344CB8AC3E}">
+        <p14:creationId xmlns:p14="http://schemas.microsoft.com/office/powerpoint/2010/main" val="4275255907"/>
+      </p:ext>
+    </p:extLst>
+  </p:cSld>
+  <p:clrMapOvr>
+    <a:masterClrMapping/>
+  </p:clrMapOvr>
+</p:sld>
+</file>
+
+<file path=ppt/slides/slide7.xml><?xml version="1.0" encoding="utf-8"?>
+<p:sld xmlns:a="http://schemas.openxmlformats.org/drawingml/2006/main" xmlns:r="http://schemas.openxmlformats.org/officeDocument/2006/relationships" xmlns:p="http://schemas.openxmlformats.org/presentationml/2006/main">
+  <p:cSld>
+    <p:spTree>
+      <p:nvGrpSpPr>
+        <p:cNvPr id="1" name=""/>
+        <p:cNvGrpSpPr/>
+        <p:nvPr/>
+      </p:nvGrpSpPr>
+      <p:grpSpPr>
+        <a:xfrm>
+          <a:off x="0" y="0"/>
+          <a:ext cx="0" cy="0"/>
+          <a:chOff x="0" y="0"/>
+          <a:chExt cx="0" cy="0"/>
+        </a:xfrm>
+      </p:grpSpPr>
+      <p:sp>
+        <p:nvSpPr>
+          <p:cNvPr id="6" name="TextBox 5">
+            <a:extLst>
+              <a:ext uri="{FF2B5EF4-FFF2-40B4-BE49-F238E27FC236}">
+                <a16:creationId xmlns:a16="http://schemas.microsoft.com/office/drawing/2014/main" id="{5C3E6C10-2305-6E46-B8CE-D2009F042578}"/>
+              </a:ext>
+            </a:extLst>
+          </p:cNvPr>
+          <p:cNvSpPr txBox="1"/>
+          <p:nvPr/>
+        </p:nvSpPr>
+        <p:spPr>
+          <a:xfrm>
+            <a:off x="381434" y="85416"/>
+            <a:ext cx="389850" cy="307777"/>
+          </a:xfrm>
+          <a:prstGeom prst="rect">
+            <a:avLst/>
+          </a:prstGeom>
+          <a:noFill/>
+        </p:spPr>
+        <p:txBody>
+          <a:bodyPr wrap="square" rtlCol="0">
+            <a:spAutoFit/>
+          </a:bodyPr>
+          <a:lstStyle/>
+          <a:p>
+            <a:r>
+              <a:rPr lang="en-US" sz="1400" dirty="0">
+                <a:latin typeface="Helvetica" pitchFamily="2" charset="0"/>
+              </a:rPr>
+              <a:t>a)</a:t>
+            </a:r>
+          </a:p>
+        </p:txBody>
+      </p:sp>
+      <p:sp>
+        <p:nvSpPr>
+          <p:cNvPr id="7" name="TextBox 6">
+            <a:extLst>
+              <a:ext uri="{FF2B5EF4-FFF2-40B4-BE49-F238E27FC236}">
+                <a16:creationId xmlns:a16="http://schemas.microsoft.com/office/drawing/2014/main" id="{49E1F3BF-9F09-D748-8A47-2C500E62CFFB}"/>
+              </a:ext>
+            </a:extLst>
+          </p:cNvPr>
+          <p:cNvSpPr txBox="1"/>
+          <p:nvPr/>
+        </p:nvSpPr>
+        <p:spPr>
+          <a:xfrm>
+            <a:off x="6023977" y="85415"/>
+            <a:ext cx="389850" cy="307777"/>
+          </a:xfrm>
+          <a:prstGeom prst="rect">
+            <a:avLst/>
+          </a:prstGeom>
+          <a:noFill/>
+        </p:spPr>
+        <p:txBody>
+          <a:bodyPr wrap="square" rtlCol="0">
+            <a:spAutoFit/>
+          </a:bodyPr>
+          <a:lstStyle/>
+          <a:p>
+            <a:r>
+              <a:rPr lang="en-US" sz="1400" dirty="0">
+                <a:latin typeface="Helvetica" pitchFamily="2" charset="0"/>
+              </a:rPr>
+              <a:t>b)</a:t>
+            </a:r>
+          </a:p>
+        </p:txBody>
+      </p:sp>
+      <p:pic>
+        <p:nvPicPr>
+          <p:cNvPr id="3" name="Picture 2">
+            <a:extLst>
+              <a:ext uri="{FF2B5EF4-FFF2-40B4-BE49-F238E27FC236}">
+                <a16:creationId xmlns:a16="http://schemas.microsoft.com/office/drawing/2014/main" id="{B3B7AE42-0B91-784F-AE74-5391C13654AF}"/>
+              </a:ext>
+            </a:extLst>
+          </p:cNvPr>
+          <p:cNvPicPr>
+            <a:picLocks noChangeAspect="1"/>
+          </p:cNvPicPr>
+          <p:nvPr/>
+        </p:nvPicPr>
+        <p:blipFill rotWithShape="1">
+          <a:blip r:embed="rId3"/>
+          <a:srcRect l="-371" t="5733" r="24498"/>
+          <a:stretch/>
+        </p:blipFill>
+        <p:spPr>
+          <a:xfrm>
+            <a:off x="0" y="393192"/>
+            <a:ext cx="5203371" cy="6464808"/>
+          </a:xfrm>
+          <a:prstGeom prst="rect">
+            <a:avLst/>
+          </a:prstGeom>
+        </p:spPr>
+      </p:pic>
+      <p:pic>
+        <p:nvPicPr>
+          <p:cNvPr id="8" name="Picture 7">
+            <a:extLst>
+              <a:ext uri="{FF2B5EF4-FFF2-40B4-BE49-F238E27FC236}">
+                <a16:creationId xmlns:a16="http://schemas.microsoft.com/office/drawing/2014/main" id="{593BF2DE-E72E-A846-B967-52DD8C587378}"/>
+              </a:ext>
+            </a:extLst>
+          </p:cNvPr>
+          <p:cNvPicPr>
+            <a:picLocks noChangeAspect="1"/>
+          </p:cNvPicPr>
+          <p:nvPr/>
+        </p:nvPicPr>
+        <p:blipFill rotWithShape="1">
+          <a:blip r:embed="rId4"/>
+          <a:srcRect l="3016" t="5733"/>
+          <a:stretch/>
+        </p:blipFill>
+        <p:spPr>
+          <a:xfrm>
+            <a:off x="5584805" y="393192"/>
+            <a:ext cx="6651171" cy="6464809"/>
+          </a:xfrm>
+          <a:prstGeom prst="rect">
+            <a:avLst/>
+          </a:prstGeom>
+        </p:spPr>
+      </p:pic>
+    </p:spTree>
+    <p:extLst>
+      <p:ext uri="{BB962C8B-B14F-4D97-AF65-F5344CB8AC3E}">
+        <p14:creationId xmlns:p14="http://schemas.microsoft.com/office/powerpoint/2010/main" val="981570944"/>
+      </p:ext>
+    </p:extLst>
+  </p:cSld>
+  <p:clrMapOvr>
+    <a:masterClrMapping/>
+  </p:clrMapOvr>
+</p:sld>
+</file>
+
+<file path=ppt/slides/slide8.xml><?xml version="1.0" encoding="utf-8"?>
+<p:sld xmlns:a="http://schemas.openxmlformats.org/drawingml/2006/main" xmlns:r="http://schemas.openxmlformats.org/officeDocument/2006/relationships" xmlns:p="http://schemas.openxmlformats.org/presentationml/2006/main">
+  <p:cSld>
+    <p:spTree>
+      <p:nvGrpSpPr>
+        <p:cNvPr id="1" name=""/>
+        <p:cNvGrpSpPr/>
+        <p:nvPr/>
+      </p:nvGrpSpPr>
+      <p:grpSpPr>
+        <a:xfrm>
+          <a:off x="0" y="0"/>
+          <a:ext cx="0" cy="0"/>
+          <a:chOff x="0" y="0"/>
+          <a:chExt cx="0" cy="0"/>
+        </a:xfrm>
+      </p:grpSpPr>
+      <p:sp>
+        <p:nvSpPr>
+          <p:cNvPr id="10" name="TextBox 9">
+            <a:extLst>
+              <a:ext uri="{FF2B5EF4-FFF2-40B4-BE49-F238E27FC236}">
+                <a16:creationId xmlns:a16="http://schemas.microsoft.com/office/drawing/2014/main" id="{BBBFFBA9-E8A3-024A-8076-537C5357F6FB}"/>
+              </a:ext>
+            </a:extLst>
+          </p:cNvPr>
+          <p:cNvSpPr txBox="1"/>
+          <p:nvPr/>
+        </p:nvSpPr>
+        <p:spPr>
+          <a:xfrm>
+            <a:off x="821890" y="85415"/>
+            <a:ext cx="389850" cy="307777"/>
+          </a:xfrm>
+          <a:prstGeom prst="rect">
+            <a:avLst/>
+          </a:prstGeom>
+          <a:noFill/>
+        </p:spPr>
+        <p:txBody>
+          <a:bodyPr wrap="square" rtlCol="0">
+            <a:spAutoFit/>
+          </a:bodyPr>
+          <a:lstStyle/>
+          <a:p>
+            <a:r>
+              <a:rPr lang="en-US" sz="1400" dirty="0">
+                <a:latin typeface="Helvetica" pitchFamily="2" charset="0"/>
+              </a:rPr>
+              <a:t>a)</a:t>
+            </a:r>
+          </a:p>
+        </p:txBody>
+      </p:sp>
+      <p:sp>
+        <p:nvSpPr>
+          <p:cNvPr id="11" name="TextBox 10">
+            <a:extLst>
+              <a:ext uri="{FF2B5EF4-FFF2-40B4-BE49-F238E27FC236}">
+                <a16:creationId xmlns:a16="http://schemas.microsoft.com/office/drawing/2014/main" id="{AE750F63-E421-7041-ADE4-8857C715E3AF}"/>
+              </a:ext>
+            </a:extLst>
+          </p:cNvPr>
+          <p:cNvSpPr txBox="1"/>
+          <p:nvPr/>
+        </p:nvSpPr>
+        <p:spPr>
+          <a:xfrm>
+            <a:off x="5961926" y="85415"/>
+            <a:ext cx="389850" cy="307777"/>
+          </a:xfrm>
+          <a:prstGeom prst="rect">
+            <a:avLst/>
+          </a:prstGeom>
+          <a:noFill/>
+        </p:spPr>
+        <p:txBody>
+          <a:bodyPr wrap="square" rtlCol="0">
+            <a:spAutoFit/>
+          </a:bodyPr>
+          <a:lstStyle/>
+          <a:p>
+            <a:r>
+              <a:rPr lang="en-US" sz="1400" dirty="0">
+                <a:latin typeface="Helvetica" pitchFamily="2" charset="0"/>
+              </a:rPr>
+              <a:t>b)</a:t>
+            </a:r>
+          </a:p>
+        </p:txBody>
+      </p:sp>
+      <p:pic>
+        <p:nvPicPr>
+          <p:cNvPr id="3" name="Picture 2">
+            <a:extLst>
+              <a:ext uri="{FF2B5EF4-FFF2-40B4-BE49-F238E27FC236}">
+                <a16:creationId xmlns:a16="http://schemas.microsoft.com/office/drawing/2014/main" id="{D0F51D42-4D92-DC4A-8D8F-C2390A2F07FF}"/>
+              </a:ext>
+            </a:extLst>
+          </p:cNvPr>
+          <p:cNvPicPr>
+            <a:picLocks noChangeAspect="1"/>
+          </p:cNvPicPr>
+          <p:nvPr/>
+        </p:nvPicPr>
+        <p:blipFill rotWithShape="1">
+          <a:blip r:embed="rId2"/>
+          <a:srcRect t="5733" r="24603"/>
+          <a:stretch/>
+        </p:blipFill>
+        <p:spPr>
+          <a:xfrm>
+            <a:off x="184059" y="393192"/>
+            <a:ext cx="5170714" cy="6464808"/>
+          </a:xfrm>
+          <a:prstGeom prst="rect">
+            <a:avLst/>
+          </a:prstGeom>
+        </p:spPr>
+      </p:pic>
+      <p:pic>
+        <p:nvPicPr>
+          <p:cNvPr id="7" name="Picture 6">
+            <a:extLst>
+              <a:ext uri="{FF2B5EF4-FFF2-40B4-BE49-F238E27FC236}">
+                <a16:creationId xmlns:a16="http://schemas.microsoft.com/office/drawing/2014/main" id="{B4A405A4-0F5F-DB42-8AD3-3DE00B0159D1}"/>
+              </a:ext>
+            </a:extLst>
+          </p:cNvPr>
+          <p:cNvPicPr>
+            <a:picLocks noChangeAspect="1"/>
+          </p:cNvPicPr>
+          <p:nvPr/>
+        </p:nvPicPr>
+        <p:blipFill rotWithShape="1">
+          <a:blip r:embed="rId3"/>
+          <a:srcRect l="3254" t="5733"/>
+          <a:stretch/>
+        </p:blipFill>
+        <p:spPr>
+          <a:xfrm>
+            <a:off x="5557157" y="393192"/>
+            <a:ext cx="6634843" cy="6464808"/>
+          </a:xfrm>
+          <a:prstGeom prst="rect">
+            <a:avLst/>
+          </a:prstGeom>
+        </p:spPr>
+      </p:pic>
+    </p:spTree>
+    <p:extLst>
+      <p:ext uri="{BB962C8B-B14F-4D97-AF65-F5344CB8AC3E}">
+        <p14:creationId xmlns:p14="http://schemas.microsoft.com/office/powerpoint/2010/main" val="2489397773"/>
+      </p:ext>
+    </p:extLst>
+  </p:cSld>
+  <p:clrMapOvr>
+    <a:masterClrMapping/>
+  </p:clrMapOvr>
+</p:sld>
+</file>
+
+<file path=ppt/slides/slide9.xml><?xml version="1.0" encoding="utf-8"?>
+<p:sld xmlns:a="http://schemas.openxmlformats.org/drawingml/2006/main" xmlns:r="http://schemas.openxmlformats.org/officeDocument/2006/relationships" xmlns:p="http://schemas.openxmlformats.org/presentationml/2006/main">
+  <p:cSld>
+    <p:spTree>
+      <p:nvGrpSpPr>
+        <p:cNvPr id="1" name=""/>
+        <p:cNvGrpSpPr/>
+        <p:nvPr/>
+      </p:nvGrpSpPr>
+      <p:grpSpPr>
+        <a:xfrm>
+          <a:off x="0" y="0"/>
+          <a:ext cx="0" cy="0"/>
+          <a:chOff x="0" y="0"/>
+          <a:chExt cx="0" cy="0"/>
+        </a:xfrm>
+      </p:grpSpPr>
+      <p:sp>
+        <p:nvSpPr>
+          <p:cNvPr id="14" name="TextBox 13">
+            <a:extLst>
+              <a:ext uri="{FF2B5EF4-FFF2-40B4-BE49-F238E27FC236}">
+                <a16:creationId xmlns:a16="http://schemas.microsoft.com/office/drawing/2014/main" id="{C5454FB1-F963-2C42-96AC-48F12C2C911F}"/>
+              </a:ext>
+            </a:extLst>
+          </p:cNvPr>
+          <p:cNvSpPr txBox="1"/>
+          <p:nvPr/>
+        </p:nvSpPr>
+        <p:spPr>
+          <a:xfrm>
+            <a:off x="967285" y="85415"/>
+            <a:ext cx="389850" cy="307777"/>
+          </a:xfrm>
+          <a:prstGeom prst="rect">
+            <a:avLst/>
+          </a:prstGeom>
+          <a:noFill/>
+        </p:spPr>
+        <p:txBody>
+          <a:bodyPr wrap="square" rtlCol="0">
+            <a:spAutoFit/>
+          </a:bodyPr>
+          <a:lstStyle/>
+          <a:p>
+            <a:r>
+              <a:rPr lang="en-US" sz="1400" dirty="0">
+                <a:latin typeface="Helvetica" pitchFamily="2" charset="0"/>
+              </a:rPr>
+              <a:t>a)</a:t>
+            </a:r>
+          </a:p>
+        </p:txBody>
+      </p:sp>
+      <p:sp>
+        <p:nvSpPr>
+          <p:cNvPr id="10" name="TextBox 9">
+            <a:extLst>
+              <a:ext uri="{FF2B5EF4-FFF2-40B4-BE49-F238E27FC236}">
+                <a16:creationId xmlns:a16="http://schemas.microsoft.com/office/drawing/2014/main" id="{C5454FB1-F963-2C42-96AC-48F12C2C911F}"/>
+              </a:ext>
+            </a:extLst>
+          </p:cNvPr>
+          <p:cNvSpPr txBox="1"/>
+          <p:nvPr/>
+        </p:nvSpPr>
+        <p:spPr>
+          <a:xfrm>
+            <a:off x="5816044" y="85415"/>
+            <a:ext cx="389850" cy="307777"/>
+          </a:xfrm>
+          <a:prstGeom prst="rect">
+            <a:avLst/>
+          </a:prstGeom>
+          <a:noFill/>
+        </p:spPr>
+        <p:txBody>
+          <a:bodyPr wrap="square" rtlCol="0">
+            <a:spAutoFit/>
+          </a:bodyPr>
+          <a:lstStyle/>
+          <a:p>
+            <a:r>
+              <a:rPr lang="en-US" sz="1400" dirty="0">
+                <a:latin typeface="Helvetica" pitchFamily="2" charset="0"/>
+              </a:rPr>
+              <a:t>b)</a:t>
+            </a:r>
+          </a:p>
+        </p:txBody>
+      </p:sp>
+      <p:pic>
+        <p:nvPicPr>
+          <p:cNvPr id="4" name="Picture 3">
+            <a:extLst>
+              <a:ext uri="{FF2B5EF4-FFF2-40B4-BE49-F238E27FC236}">
+                <a16:creationId xmlns:a16="http://schemas.microsoft.com/office/drawing/2014/main" id="{08A47F9F-6259-D74F-97C0-8B1037697E8E}"/>
+              </a:ext>
+            </a:extLst>
+          </p:cNvPr>
+          <p:cNvPicPr>
+            <a:picLocks noChangeAspect="1"/>
+          </p:cNvPicPr>
+          <p:nvPr/>
+        </p:nvPicPr>
+        <p:blipFill rotWithShape="1">
+          <a:blip r:embed="rId2"/>
+          <a:srcRect l="2302" t="5733" r="24365"/>
+          <a:stretch/>
+        </p:blipFill>
+        <p:spPr>
+          <a:xfrm>
+            <a:off x="326570" y="393192"/>
+            <a:ext cx="5029201" cy="6464808"/>
+          </a:xfrm>
+          <a:prstGeom prst="rect">
+            <a:avLst/>
+          </a:prstGeom>
+        </p:spPr>
+      </p:pic>
+      <p:pic>
+        <p:nvPicPr>
+          <p:cNvPr id="7" name="Picture 6">
+            <a:extLst>
+              <a:ext uri="{FF2B5EF4-FFF2-40B4-BE49-F238E27FC236}">
+                <a16:creationId xmlns:a16="http://schemas.microsoft.com/office/drawing/2014/main" id="{1B0F723B-E8FD-EA42-89FE-C0376492DECF}"/>
+              </a:ext>
+            </a:extLst>
+          </p:cNvPr>
+          <p:cNvPicPr>
+            <a:picLocks noChangeAspect="1"/>
+          </p:cNvPicPr>
+          <p:nvPr/>
+        </p:nvPicPr>
+        <p:blipFill rotWithShape="1">
+          <a:blip r:embed="rId3"/>
+          <a:srcRect l="3254" t="5733"/>
+          <a:stretch/>
+        </p:blipFill>
+        <p:spPr>
+          <a:xfrm>
+            <a:off x="5557157" y="393192"/>
+            <a:ext cx="6634843" cy="6464808"/>
+          </a:xfrm>
+          <a:prstGeom prst="rect">
+            <a:avLst/>
+          </a:prstGeom>
+        </p:spPr>
+      </p:pic>
+    </p:spTree>
+    <p:extLst>
+      <p:ext uri="{BB962C8B-B14F-4D97-AF65-F5344CB8AC3E}">
+        <p14:creationId xmlns:p14="http://schemas.microsoft.com/office/powerpoint/2010/main" val="186431385"/>
       </p:ext>
     </p:extLst>
   </p:cSld>

</xml_diff>

<commit_message>
updating plots and analyses
</commit_message>
<xml_diff>
--- a/analyses/figures/muplotextras/muplotprep.pptx
+++ b/analyses/figures/muplotextras/muplotprep.pptx
@@ -208,7 +208,7 @@
           <a:p>
             <a:fld id="{50109146-7479-554D-95AE-0AFDDADBF6E9}" type="datetimeFigureOut">
               <a:rPr lang="en-US" smtClean="0"/>
-              <a:t>8/18/20</a:t>
+              <a:t>11/23/20</a:t>
             </a:fld>
             <a:endParaRPr lang="en-US"/>
           </a:p>
@@ -790,7 +790,7 @@
           <a:p>
             <a:fld id="{61D5BA3A-DD4C-6840-8061-179B7C5E8DD5}" type="datetimeFigureOut">
               <a:rPr lang="en-US" smtClean="0"/>
-              <a:t>8/18/20</a:t>
+              <a:t>11/23/20</a:t>
             </a:fld>
             <a:endParaRPr lang="en-US"/>
           </a:p>
@@ -988,7 +988,7 @@
           <a:p>
             <a:fld id="{61D5BA3A-DD4C-6840-8061-179B7C5E8DD5}" type="datetimeFigureOut">
               <a:rPr lang="en-US" smtClean="0"/>
-              <a:t>8/18/20</a:t>
+              <a:t>11/23/20</a:t>
             </a:fld>
             <a:endParaRPr lang="en-US"/>
           </a:p>
@@ -1196,7 +1196,7 @@
           <a:p>
             <a:fld id="{61D5BA3A-DD4C-6840-8061-179B7C5E8DD5}" type="datetimeFigureOut">
               <a:rPr lang="en-US" smtClean="0"/>
-              <a:t>8/18/20</a:t>
+              <a:t>11/23/20</a:t>
             </a:fld>
             <a:endParaRPr lang="en-US"/>
           </a:p>
@@ -1394,7 +1394,7 @@
           <a:p>
             <a:fld id="{61D5BA3A-DD4C-6840-8061-179B7C5E8DD5}" type="datetimeFigureOut">
               <a:rPr lang="en-US" smtClean="0"/>
-              <a:t>8/18/20</a:t>
+              <a:t>11/23/20</a:t>
             </a:fld>
             <a:endParaRPr lang="en-US"/>
           </a:p>
@@ -1669,7 +1669,7 @@
           <a:p>
             <a:fld id="{61D5BA3A-DD4C-6840-8061-179B7C5E8DD5}" type="datetimeFigureOut">
               <a:rPr lang="en-US" smtClean="0"/>
-              <a:t>8/18/20</a:t>
+              <a:t>11/23/20</a:t>
             </a:fld>
             <a:endParaRPr lang="en-US"/>
           </a:p>
@@ -1934,7 +1934,7 @@
           <a:p>
             <a:fld id="{61D5BA3A-DD4C-6840-8061-179B7C5E8DD5}" type="datetimeFigureOut">
               <a:rPr lang="en-US" smtClean="0"/>
-              <a:t>8/18/20</a:t>
+              <a:t>11/23/20</a:t>
             </a:fld>
             <a:endParaRPr lang="en-US"/>
           </a:p>
@@ -2346,7 +2346,7 @@
           <a:p>
             <a:fld id="{61D5BA3A-DD4C-6840-8061-179B7C5E8DD5}" type="datetimeFigureOut">
               <a:rPr lang="en-US" smtClean="0"/>
-              <a:t>8/18/20</a:t>
+              <a:t>11/23/20</a:t>
             </a:fld>
             <a:endParaRPr lang="en-US"/>
           </a:p>
@@ -2487,7 +2487,7 @@
           <a:p>
             <a:fld id="{61D5BA3A-DD4C-6840-8061-179B7C5E8DD5}" type="datetimeFigureOut">
               <a:rPr lang="en-US" smtClean="0"/>
-              <a:t>8/18/20</a:t>
+              <a:t>11/23/20</a:t>
             </a:fld>
             <a:endParaRPr lang="en-US"/>
           </a:p>
@@ -2600,7 +2600,7 @@
           <a:p>
             <a:fld id="{61D5BA3A-DD4C-6840-8061-179B7C5E8DD5}" type="datetimeFigureOut">
               <a:rPr lang="en-US" smtClean="0"/>
-              <a:t>8/18/20</a:t>
+              <a:t>11/23/20</a:t>
             </a:fld>
             <a:endParaRPr lang="en-US"/>
           </a:p>
@@ -2911,7 +2911,7 @@
           <a:p>
             <a:fld id="{61D5BA3A-DD4C-6840-8061-179B7C5E8DD5}" type="datetimeFigureOut">
               <a:rPr lang="en-US" smtClean="0"/>
-              <a:t>8/18/20</a:t>
+              <a:t>11/23/20</a:t>
             </a:fld>
             <a:endParaRPr lang="en-US"/>
           </a:p>
@@ -3199,7 +3199,7 @@
           <a:p>
             <a:fld id="{61D5BA3A-DD4C-6840-8061-179B7C5E8DD5}" type="datetimeFigureOut">
               <a:rPr lang="en-US" smtClean="0"/>
-              <a:t>8/18/20</a:t>
+              <a:t>11/23/20</a:t>
             </a:fld>
             <a:endParaRPr lang="en-US"/>
           </a:p>
@@ -3440,7 +3440,7 @@
           <a:p>
             <a:fld id="{61D5BA3A-DD4C-6840-8061-179B7C5E8DD5}" type="datetimeFigureOut">
               <a:rPr lang="en-US" smtClean="0"/>
-              <a:t>8/18/20</a:t>
+              <a:t>11/23/20</a:t>
             </a:fld>
             <a:endParaRPr lang="en-US"/>
           </a:p>
@@ -4101,10 +4101,10 @@
       </p:sp>
       <p:pic>
         <p:nvPicPr>
-          <p:cNvPr id="5" name="Picture 4">
-            <a:extLst>
-              <a:ext uri="{FF2B5EF4-FFF2-40B4-BE49-F238E27FC236}">
-                <a16:creationId xmlns:a16="http://schemas.microsoft.com/office/drawing/2014/main" id="{E0FB24CB-15F9-B248-8BED-B35F4446579E}"/>
+          <p:cNvPr id="3" name="Picture 2">
+            <a:extLst>
+              <a:ext uri="{FF2B5EF4-FFF2-40B4-BE49-F238E27FC236}">
+                <a16:creationId xmlns:a16="http://schemas.microsoft.com/office/drawing/2014/main" id="{786BE471-957E-3B45-82B2-A8508BF78D78}"/>
               </a:ext>
             </a:extLst>
           </p:cNvPr>
@@ -4115,13 +4115,13 @@
         </p:nvPicPr>
         <p:blipFill rotWithShape="1">
           <a:blip r:embed="rId2"/>
-          <a:srcRect l="15734" t="5994"/>
+          <a:srcRect t="5733" r="24406"/>
           <a:stretch/>
         </p:blipFill>
         <p:spPr>
           <a:xfrm>
-            <a:off x="6325341" y="547079"/>
-            <a:ext cx="5794977" cy="6464808"/>
+            <a:off x="682432" y="547079"/>
+            <a:ext cx="5184228" cy="6464808"/>
           </a:xfrm>
           <a:prstGeom prst="rect">
             <a:avLst/>
@@ -4130,10 +4130,10 @@
       </p:pic>
       <p:pic>
         <p:nvPicPr>
-          <p:cNvPr id="4" name="Picture 3">
-            <a:extLst>
-              <a:ext uri="{FF2B5EF4-FFF2-40B4-BE49-F238E27FC236}">
-                <a16:creationId xmlns:a16="http://schemas.microsoft.com/office/drawing/2014/main" id="{94EA8EBE-10FD-A14E-872B-08BBA2724312}"/>
+          <p:cNvPr id="7" name="Picture 6">
+            <a:extLst>
+              <a:ext uri="{FF2B5EF4-FFF2-40B4-BE49-F238E27FC236}">
+                <a16:creationId xmlns:a16="http://schemas.microsoft.com/office/drawing/2014/main" id="{DAFBA755-6FB2-4440-BE12-74DC15862BE0}"/>
               </a:ext>
             </a:extLst>
           </p:cNvPr>
@@ -4144,13 +4144,13 @@
         </p:nvPicPr>
         <p:blipFill rotWithShape="1">
           <a:blip r:embed="rId3"/>
-          <a:srcRect t="5733" r="23835"/>
+          <a:srcRect l="15823" t="5733"/>
           <a:stretch/>
         </p:blipFill>
         <p:spPr>
           <a:xfrm>
-            <a:off x="228600" y="547079"/>
-            <a:ext cx="5223387" cy="6464808"/>
+            <a:off x="6325342" y="547079"/>
+            <a:ext cx="5772807" cy="6464808"/>
           </a:xfrm>
           <a:prstGeom prst="rect">
             <a:avLst/>
@@ -4263,10 +4263,10 @@
       </p:sp>
       <p:pic>
         <p:nvPicPr>
-          <p:cNvPr id="6" name="Picture 5">
-            <a:extLst>
-              <a:ext uri="{FF2B5EF4-FFF2-40B4-BE49-F238E27FC236}">
-                <a16:creationId xmlns:a16="http://schemas.microsoft.com/office/drawing/2014/main" id="{9363F5A3-F3A9-6B40-8068-111BA7F472C3}"/>
+          <p:cNvPr id="4" name="Picture 3">
+            <a:extLst>
+              <a:ext uri="{FF2B5EF4-FFF2-40B4-BE49-F238E27FC236}">
+                <a16:creationId xmlns:a16="http://schemas.microsoft.com/office/drawing/2014/main" id="{02B3B184-B0A8-1545-87C9-98C0393D310C}"/>
               </a:ext>
             </a:extLst>
           </p:cNvPr>
@@ -4277,13 +4277,13 @@
         </p:nvPicPr>
         <p:blipFill rotWithShape="1">
           <a:blip r:embed="rId2"/>
-          <a:srcRect l="15734" t="5733"/>
+          <a:srcRect t="5733" r="24253"/>
           <a:stretch/>
         </p:blipFill>
         <p:spPr>
           <a:xfrm>
-            <a:off x="6327648" y="547079"/>
-            <a:ext cx="5778910" cy="6464810"/>
+            <a:off x="669615" y="547079"/>
+            <a:ext cx="5194738" cy="6464810"/>
           </a:xfrm>
           <a:prstGeom prst="rect">
             <a:avLst/>
@@ -4292,10 +4292,10 @@
       </p:pic>
       <p:pic>
         <p:nvPicPr>
-          <p:cNvPr id="3" name="Picture 2">
-            <a:extLst>
-              <a:ext uri="{FF2B5EF4-FFF2-40B4-BE49-F238E27FC236}">
-                <a16:creationId xmlns:a16="http://schemas.microsoft.com/office/drawing/2014/main" id="{8A266160-53BE-3B48-BDE8-C6EB6ED14020}"/>
+          <p:cNvPr id="7" name="Picture 6">
+            <a:extLst>
+              <a:ext uri="{FF2B5EF4-FFF2-40B4-BE49-F238E27FC236}">
+                <a16:creationId xmlns:a16="http://schemas.microsoft.com/office/drawing/2014/main" id="{1F99FC16-7146-5A4E-AA2C-A5AAA807EC18}"/>
               </a:ext>
             </a:extLst>
           </p:cNvPr>
@@ -4306,13 +4306,13 @@
         </p:nvPicPr>
         <p:blipFill rotWithShape="1">
           <a:blip r:embed="rId3"/>
-          <a:srcRect t="5733" r="24074"/>
+          <a:srcRect l="15977" t="5733"/>
           <a:stretch/>
         </p:blipFill>
         <p:spPr>
           <a:xfrm>
-            <a:off x="228600" y="547079"/>
-            <a:ext cx="5206998" cy="6464808"/>
+            <a:off x="6327649" y="547079"/>
+            <a:ext cx="5762297" cy="6464810"/>
           </a:xfrm>
           <a:prstGeom prst="rect">
             <a:avLst/>
@@ -4425,10 +4425,10 @@
       </p:sp>
       <p:pic>
         <p:nvPicPr>
-          <p:cNvPr id="9" name="Picture 8">
-            <a:extLst>
-              <a:ext uri="{FF2B5EF4-FFF2-40B4-BE49-F238E27FC236}">
-                <a16:creationId xmlns:a16="http://schemas.microsoft.com/office/drawing/2014/main" id="{AD082FAF-C567-EF4A-951F-6CDAFB389804}"/>
+          <p:cNvPr id="4" name="Picture 3">
+            <a:extLst>
+              <a:ext uri="{FF2B5EF4-FFF2-40B4-BE49-F238E27FC236}">
+                <a16:creationId xmlns:a16="http://schemas.microsoft.com/office/drawing/2014/main" id="{87111854-91CE-0846-A4EB-20302EE9813B}"/>
               </a:ext>
             </a:extLst>
           </p:cNvPr>
@@ -4439,13 +4439,13 @@
         </p:nvPicPr>
         <p:blipFill rotWithShape="1">
           <a:blip r:embed="rId3"/>
-          <a:srcRect l="15734" t="5733"/>
+          <a:srcRect t="5733" r="23487"/>
           <a:stretch/>
         </p:blipFill>
         <p:spPr>
           <a:xfrm>
-            <a:off x="6327648" y="547079"/>
-            <a:ext cx="5778910" cy="6464809"/>
+            <a:off x="617063" y="547079"/>
+            <a:ext cx="5247290" cy="6464810"/>
           </a:xfrm>
           <a:prstGeom prst="rect">
             <a:avLst/>
@@ -4454,10 +4454,10 @@
       </p:pic>
       <p:pic>
         <p:nvPicPr>
-          <p:cNvPr id="3" name="Picture 2">
-            <a:extLst>
-              <a:ext uri="{FF2B5EF4-FFF2-40B4-BE49-F238E27FC236}">
-                <a16:creationId xmlns:a16="http://schemas.microsoft.com/office/drawing/2014/main" id="{1B30A3A8-4F0D-4A47-8BA2-75864C1B7883}"/>
+          <p:cNvPr id="8" name="Picture 7">
+            <a:extLst>
+              <a:ext uri="{FF2B5EF4-FFF2-40B4-BE49-F238E27FC236}">
+                <a16:creationId xmlns:a16="http://schemas.microsoft.com/office/drawing/2014/main" id="{D2156CD2-BB9E-9744-9FAD-6F7AEAD07372}"/>
               </a:ext>
             </a:extLst>
           </p:cNvPr>
@@ -4468,13 +4468,13 @@
         </p:nvPicPr>
         <p:blipFill rotWithShape="1">
           <a:blip r:embed="rId4"/>
-          <a:srcRect t="5733" r="23580"/>
+          <a:srcRect l="15670" t="5733"/>
           <a:stretch/>
         </p:blipFill>
         <p:spPr>
           <a:xfrm>
-            <a:off x="228600" y="547078"/>
-            <a:ext cx="5240865" cy="6464808"/>
+            <a:off x="6327649" y="547079"/>
+            <a:ext cx="5783317" cy="6464810"/>
           </a:xfrm>
           <a:prstGeom prst="rect">
             <a:avLst/>

</xml_diff>

<commit_message>
chipping away at edits
</commit_message>
<xml_diff>
--- a/analyses/figures/muplotextras/muplotprep.pptx
+++ b/analyses/figures/muplotextras/muplotprep.pptx
@@ -208,7 +208,7 @@
           <a:p>
             <a:fld id="{50109146-7479-554D-95AE-0AFDDADBF6E9}" type="datetimeFigureOut">
               <a:rPr lang="en-US" smtClean="0"/>
-              <a:t>12/1/20</a:t>
+              <a:t>12/7/20</a:t>
             </a:fld>
             <a:endParaRPr lang="en-US"/>
           </a:p>
@@ -790,7 +790,7 @@
           <a:p>
             <a:fld id="{61D5BA3A-DD4C-6840-8061-179B7C5E8DD5}" type="datetimeFigureOut">
               <a:rPr lang="en-US" smtClean="0"/>
-              <a:t>12/1/20</a:t>
+              <a:t>12/7/20</a:t>
             </a:fld>
             <a:endParaRPr lang="en-US"/>
           </a:p>
@@ -988,7 +988,7 @@
           <a:p>
             <a:fld id="{61D5BA3A-DD4C-6840-8061-179B7C5E8DD5}" type="datetimeFigureOut">
               <a:rPr lang="en-US" smtClean="0"/>
-              <a:t>12/1/20</a:t>
+              <a:t>12/7/20</a:t>
             </a:fld>
             <a:endParaRPr lang="en-US"/>
           </a:p>
@@ -1196,7 +1196,7 @@
           <a:p>
             <a:fld id="{61D5BA3A-DD4C-6840-8061-179B7C5E8DD5}" type="datetimeFigureOut">
               <a:rPr lang="en-US" smtClean="0"/>
-              <a:t>12/1/20</a:t>
+              <a:t>12/7/20</a:t>
             </a:fld>
             <a:endParaRPr lang="en-US"/>
           </a:p>
@@ -1394,7 +1394,7 @@
           <a:p>
             <a:fld id="{61D5BA3A-DD4C-6840-8061-179B7C5E8DD5}" type="datetimeFigureOut">
               <a:rPr lang="en-US" smtClean="0"/>
-              <a:t>12/1/20</a:t>
+              <a:t>12/7/20</a:t>
             </a:fld>
             <a:endParaRPr lang="en-US"/>
           </a:p>
@@ -1669,7 +1669,7 @@
           <a:p>
             <a:fld id="{61D5BA3A-DD4C-6840-8061-179B7C5E8DD5}" type="datetimeFigureOut">
               <a:rPr lang="en-US" smtClean="0"/>
-              <a:t>12/1/20</a:t>
+              <a:t>12/7/20</a:t>
             </a:fld>
             <a:endParaRPr lang="en-US"/>
           </a:p>
@@ -1934,7 +1934,7 @@
           <a:p>
             <a:fld id="{61D5BA3A-DD4C-6840-8061-179B7C5E8DD5}" type="datetimeFigureOut">
               <a:rPr lang="en-US" smtClean="0"/>
-              <a:t>12/1/20</a:t>
+              <a:t>12/7/20</a:t>
             </a:fld>
             <a:endParaRPr lang="en-US"/>
           </a:p>
@@ -2346,7 +2346,7 @@
           <a:p>
             <a:fld id="{61D5BA3A-DD4C-6840-8061-179B7C5E8DD5}" type="datetimeFigureOut">
               <a:rPr lang="en-US" smtClean="0"/>
-              <a:t>12/1/20</a:t>
+              <a:t>12/7/20</a:t>
             </a:fld>
             <a:endParaRPr lang="en-US"/>
           </a:p>
@@ -2487,7 +2487,7 @@
           <a:p>
             <a:fld id="{61D5BA3A-DD4C-6840-8061-179B7C5E8DD5}" type="datetimeFigureOut">
               <a:rPr lang="en-US" smtClean="0"/>
-              <a:t>12/1/20</a:t>
+              <a:t>12/7/20</a:t>
             </a:fld>
             <a:endParaRPr lang="en-US"/>
           </a:p>
@@ -2600,7 +2600,7 @@
           <a:p>
             <a:fld id="{61D5BA3A-DD4C-6840-8061-179B7C5E8DD5}" type="datetimeFigureOut">
               <a:rPr lang="en-US" smtClean="0"/>
-              <a:t>12/1/20</a:t>
+              <a:t>12/7/20</a:t>
             </a:fld>
             <a:endParaRPr lang="en-US"/>
           </a:p>
@@ -2911,7 +2911,7 @@
           <a:p>
             <a:fld id="{61D5BA3A-DD4C-6840-8061-179B7C5E8DD5}" type="datetimeFigureOut">
               <a:rPr lang="en-US" smtClean="0"/>
-              <a:t>12/1/20</a:t>
+              <a:t>12/7/20</a:t>
             </a:fld>
             <a:endParaRPr lang="en-US"/>
           </a:p>
@@ -3199,7 +3199,7 @@
           <a:p>
             <a:fld id="{61D5BA3A-DD4C-6840-8061-179B7C5E8DD5}" type="datetimeFigureOut">
               <a:rPr lang="en-US" smtClean="0"/>
-              <a:t>12/1/20</a:t>
+              <a:t>12/7/20</a:t>
             </a:fld>
             <a:endParaRPr lang="en-US"/>
           </a:p>
@@ -3440,7 +3440,7 @@
           <a:p>
             <a:fld id="{61D5BA3A-DD4C-6840-8061-179B7C5E8DD5}" type="datetimeFigureOut">
               <a:rPr lang="en-US" smtClean="0"/>
-              <a:t>12/1/20</a:t>
+              <a:t>12/7/20</a:t>
             </a:fld>
             <a:endParaRPr lang="en-US"/>
           </a:p>
@@ -4292,10 +4292,10 @@
       </p:pic>
       <p:pic>
         <p:nvPicPr>
-          <p:cNvPr id="3" name="Picture 2">
-            <a:extLst>
-              <a:ext uri="{FF2B5EF4-FFF2-40B4-BE49-F238E27FC236}">
-                <a16:creationId xmlns:a16="http://schemas.microsoft.com/office/drawing/2014/main" id="{F47DF7A7-28A5-A341-A0A8-A76BAC191C29}"/>
+          <p:cNvPr id="4" name="Picture 3">
+            <a:extLst>
+              <a:ext uri="{FF2B5EF4-FFF2-40B4-BE49-F238E27FC236}">
+                <a16:creationId xmlns:a16="http://schemas.microsoft.com/office/drawing/2014/main" id="{A7D2EE64-C30D-C54C-AD11-1D66A45D37D0}"/>
               </a:ext>
             </a:extLst>
           </p:cNvPr>

</xml_diff>

<commit_message>
making new figures and small tweaks
</commit_message>
<xml_diff>
--- a/analyses/figures/muplotextras/muplotprep.pptx
+++ b/analyses/figures/muplotextras/muplotprep.pptx
@@ -5,7 +5,7 @@
     <p:sldMasterId id="2147483648" r:id="rId1"/>
   </p:sldMasterIdLst>
   <p:notesMasterIdLst>
-    <p:notesMasterId r:id="rId14"/>
+    <p:notesMasterId r:id="rId16"/>
   </p:notesMasterIdLst>
   <p:sldIdLst>
     <p:sldId id="256" r:id="rId2"/>
@@ -20,6 +20,8 @@
     <p:sldId id="267" r:id="rId11"/>
     <p:sldId id="268" r:id="rId12"/>
     <p:sldId id="269" r:id="rId13"/>
+    <p:sldId id="270" r:id="rId14"/>
+    <p:sldId id="272" r:id="rId15"/>
   </p:sldIdLst>
   <p:sldSz cx="12192000" cy="6858000"/>
   <p:notesSz cx="6858000" cy="9144000"/>
@@ -208,7 +210,7 @@
           <a:p>
             <a:fld id="{50109146-7479-554D-95AE-0AFDDADBF6E9}" type="datetimeFigureOut">
               <a:rPr lang="en-US" smtClean="0"/>
-              <a:t>12/7/20</a:t>
+              <a:t>12/8/20</a:t>
             </a:fld>
             <a:endParaRPr lang="en-US"/>
           </a:p>
@@ -643,6 +645,90 @@
 </p:notes>
 </file>
 
+<file path=ppt/notesSlides/notesSlide3.xml><?xml version="1.0" encoding="utf-8"?>
+<p:notes xmlns:a="http://schemas.openxmlformats.org/drawingml/2006/main" xmlns:r="http://schemas.openxmlformats.org/officeDocument/2006/relationships" xmlns:p="http://schemas.openxmlformats.org/presentationml/2006/main">
+  <p:cSld>
+    <p:spTree>
+      <p:nvGrpSpPr>
+        <p:cNvPr id="1" name=""/>
+        <p:cNvGrpSpPr/>
+        <p:nvPr/>
+      </p:nvGrpSpPr>
+      <p:grpSpPr>
+        <a:xfrm>
+          <a:off x="0" y="0"/>
+          <a:ext cx="0" cy="0"/>
+          <a:chOff x="0" y="0"/>
+          <a:chExt cx="0" cy="0"/>
+        </a:xfrm>
+      </p:grpSpPr>
+      <p:sp>
+        <p:nvSpPr>
+          <p:cNvPr id="2" name="Slide Image Placeholder 1"/>
+          <p:cNvSpPr>
+            <a:spLocks noGrp="1" noRot="1" noChangeAspect="1"/>
+          </p:cNvSpPr>
+          <p:nvPr>
+            <p:ph type="sldImg"/>
+          </p:nvPr>
+        </p:nvSpPr>
+        <p:spPr/>
+      </p:sp>
+      <p:sp>
+        <p:nvSpPr>
+          <p:cNvPr id="3" name="Notes Placeholder 2"/>
+          <p:cNvSpPr>
+            <a:spLocks noGrp="1"/>
+          </p:cNvSpPr>
+          <p:nvPr>
+            <p:ph type="body" idx="1"/>
+          </p:nvPr>
+        </p:nvSpPr>
+        <p:spPr/>
+        <p:txBody>
+          <a:bodyPr/>
+          <a:lstStyle/>
+          <a:p>
+            <a:endParaRPr lang="en-US" dirty="0"/>
+          </a:p>
+        </p:txBody>
+      </p:sp>
+      <p:sp>
+        <p:nvSpPr>
+          <p:cNvPr id="4" name="Slide Number Placeholder 3"/>
+          <p:cNvSpPr>
+            <a:spLocks noGrp="1"/>
+          </p:cNvSpPr>
+          <p:nvPr>
+            <p:ph type="sldNum" sz="quarter" idx="5"/>
+          </p:nvPr>
+        </p:nvSpPr>
+        <p:spPr/>
+        <p:txBody>
+          <a:bodyPr/>
+          <a:lstStyle/>
+          <a:p>
+            <a:fld id="{CEB6A80D-3228-3343-94CC-F7DBC408B143}" type="slidenum">
+              <a:rPr lang="en-US" smtClean="0"/>
+              <a:t>14</a:t>
+            </a:fld>
+            <a:endParaRPr lang="en-US"/>
+          </a:p>
+        </p:txBody>
+      </p:sp>
+    </p:spTree>
+    <p:extLst>
+      <p:ext uri="{BB962C8B-B14F-4D97-AF65-F5344CB8AC3E}">
+        <p14:creationId xmlns:p14="http://schemas.microsoft.com/office/powerpoint/2010/main" val="1928428849"/>
+      </p:ext>
+    </p:extLst>
+  </p:cSld>
+  <p:clrMapOvr>
+    <a:masterClrMapping/>
+  </p:clrMapOvr>
+</p:notes>
+</file>
+
 <file path=ppt/slideLayouts/slideLayout1.xml><?xml version="1.0" encoding="utf-8"?>
 <p:sldLayout xmlns:a="http://schemas.openxmlformats.org/drawingml/2006/main" xmlns:r="http://schemas.openxmlformats.org/officeDocument/2006/relationships" xmlns:p="http://schemas.openxmlformats.org/presentationml/2006/main" type="title" preserve="1">
   <p:cSld name="Title Slide">
@@ -790,7 +876,7 @@
           <a:p>
             <a:fld id="{61D5BA3A-DD4C-6840-8061-179B7C5E8DD5}" type="datetimeFigureOut">
               <a:rPr lang="en-US" smtClean="0"/>
-              <a:t>12/7/20</a:t>
+              <a:t>12/8/20</a:t>
             </a:fld>
             <a:endParaRPr lang="en-US"/>
           </a:p>
@@ -988,7 +1074,7 @@
           <a:p>
             <a:fld id="{61D5BA3A-DD4C-6840-8061-179B7C5E8DD5}" type="datetimeFigureOut">
               <a:rPr lang="en-US" smtClean="0"/>
-              <a:t>12/7/20</a:t>
+              <a:t>12/8/20</a:t>
             </a:fld>
             <a:endParaRPr lang="en-US"/>
           </a:p>
@@ -1196,7 +1282,7 @@
           <a:p>
             <a:fld id="{61D5BA3A-DD4C-6840-8061-179B7C5E8DD5}" type="datetimeFigureOut">
               <a:rPr lang="en-US" smtClean="0"/>
-              <a:t>12/7/20</a:t>
+              <a:t>12/8/20</a:t>
             </a:fld>
             <a:endParaRPr lang="en-US"/>
           </a:p>
@@ -1394,7 +1480,7 @@
           <a:p>
             <a:fld id="{61D5BA3A-DD4C-6840-8061-179B7C5E8DD5}" type="datetimeFigureOut">
               <a:rPr lang="en-US" smtClean="0"/>
-              <a:t>12/7/20</a:t>
+              <a:t>12/8/20</a:t>
             </a:fld>
             <a:endParaRPr lang="en-US"/>
           </a:p>
@@ -1669,7 +1755,7 @@
           <a:p>
             <a:fld id="{61D5BA3A-DD4C-6840-8061-179B7C5E8DD5}" type="datetimeFigureOut">
               <a:rPr lang="en-US" smtClean="0"/>
-              <a:t>12/7/20</a:t>
+              <a:t>12/8/20</a:t>
             </a:fld>
             <a:endParaRPr lang="en-US"/>
           </a:p>
@@ -1934,7 +2020,7 @@
           <a:p>
             <a:fld id="{61D5BA3A-DD4C-6840-8061-179B7C5E8DD5}" type="datetimeFigureOut">
               <a:rPr lang="en-US" smtClean="0"/>
-              <a:t>12/7/20</a:t>
+              <a:t>12/8/20</a:t>
             </a:fld>
             <a:endParaRPr lang="en-US"/>
           </a:p>
@@ -2346,7 +2432,7 @@
           <a:p>
             <a:fld id="{61D5BA3A-DD4C-6840-8061-179B7C5E8DD5}" type="datetimeFigureOut">
               <a:rPr lang="en-US" smtClean="0"/>
-              <a:t>12/7/20</a:t>
+              <a:t>12/8/20</a:t>
             </a:fld>
             <a:endParaRPr lang="en-US"/>
           </a:p>
@@ -2487,7 +2573,7 @@
           <a:p>
             <a:fld id="{61D5BA3A-DD4C-6840-8061-179B7C5E8DD5}" type="datetimeFigureOut">
               <a:rPr lang="en-US" smtClean="0"/>
-              <a:t>12/7/20</a:t>
+              <a:t>12/8/20</a:t>
             </a:fld>
             <a:endParaRPr lang="en-US"/>
           </a:p>
@@ -2600,7 +2686,7 @@
           <a:p>
             <a:fld id="{61D5BA3A-DD4C-6840-8061-179B7C5E8DD5}" type="datetimeFigureOut">
               <a:rPr lang="en-US" smtClean="0"/>
-              <a:t>12/7/20</a:t>
+              <a:t>12/8/20</a:t>
             </a:fld>
             <a:endParaRPr lang="en-US"/>
           </a:p>
@@ -2911,7 +2997,7 @@
           <a:p>
             <a:fld id="{61D5BA3A-DD4C-6840-8061-179B7C5E8DD5}" type="datetimeFigureOut">
               <a:rPr lang="en-US" smtClean="0"/>
-              <a:t>12/7/20</a:t>
+              <a:t>12/8/20</a:t>
             </a:fld>
             <a:endParaRPr lang="en-US"/>
           </a:p>
@@ -3199,7 +3285,7 @@
           <a:p>
             <a:fld id="{61D5BA3A-DD4C-6840-8061-179B7C5E8DD5}" type="datetimeFigureOut">
               <a:rPr lang="en-US" smtClean="0"/>
-              <a:t>12/7/20</a:t>
+              <a:t>12/8/20</a:t>
             </a:fld>
             <a:endParaRPr lang="en-US"/>
           </a:p>
@@ -3440,7 +3526,7 @@
           <a:p>
             <a:fld id="{61D5BA3A-DD4C-6840-8061-179B7C5E8DD5}" type="datetimeFigureOut">
               <a:rPr lang="en-US" smtClean="0"/>
-              <a:t>12/7/20</a:t>
+              <a:t>12/8/20</a:t>
             </a:fld>
             <a:endParaRPr lang="en-US"/>
           </a:p>
@@ -4485,6 +4571,314 @@
     <p:extLst>
       <p:ext uri="{BB962C8B-B14F-4D97-AF65-F5344CB8AC3E}">
         <p14:creationId xmlns:p14="http://schemas.microsoft.com/office/powerpoint/2010/main" val="1795034378"/>
+      </p:ext>
+    </p:extLst>
+  </p:cSld>
+  <p:clrMapOvr>
+    <a:masterClrMapping/>
+  </p:clrMapOvr>
+</p:sld>
+</file>
+
+<file path=ppt/slides/slide13.xml><?xml version="1.0" encoding="utf-8"?>
+<p:sld xmlns:a="http://schemas.openxmlformats.org/drawingml/2006/main" xmlns:r="http://schemas.openxmlformats.org/officeDocument/2006/relationships" xmlns:p="http://schemas.openxmlformats.org/presentationml/2006/main">
+  <p:cSld>
+    <p:spTree>
+      <p:nvGrpSpPr>
+        <p:cNvPr id="1" name=""/>
+        <p:cNvGrpSpPr/>
+        <p:nvPr/>
+      </p:nvGrpSpPr>
+      <p:grpSpPr>
+        <a:xfrm>
+          <a:off x="0" y="0"/>
+          <a:ext cx="0" cy="0"/>
+          <a:chOff x="0" y="0"/>
+          <a:chExt cx="0" cy="0"/>
+        </a:xfrm>
+      </p:grpSpPr>
+      <p:pic>
+        <p:nvPicPr>
+          <p:cNvPr id="5" name="Picture 4">
+            <a:extLst>
+              <a:ext uri="{FF2B5EF4-FFF2-40B4-BE49-F238E27FC236}">
+                <a16:creationId xmlns:a16="http://schemas.microsoft.com/office/drawing/2014/main" id="{410630EF-D026-8E4E-AE0B-F159D632FAE9}"/>
+              </a:ext>
+            </a:extLst>
+          </p:cNvPr>
+          <p:cNvPicPr>
+            <a:picLocks noChangeAspect="1"/>
+          </p:cNvPicPr>
+          <p:nvPr/>
+        </p:nvPicPr>
+        <p:blipFill rotWithShape="1">
+          <a:blip r:embed="rId2"/>
+          <a:srcRect t="5797" r="24493"/>
+          <a:stretch/>
+        </p:blipFill>
+        <p:spPr>
+          <a:xfrm>
+            <a:off x="0" y="1712616"/>
+            <a:ext cx="3325443" cy="4148825"/>
+          </a:xfrm>
+          <a:prstGeom prst="rect">
+            <a:avLst/>
+          </a:prstGeom>
+        </p:spPr>
+      </p:pic>
+      <p:pic>
+        <p:nvPicPr>
+          <p:cNvPr id="7" name="Picture 6">
+            <a:extLst>
+              <a:ext uri="{FF2B5EF4-FFF2-40B4-BE49-F238E27FC236}">
+                <a16:creationId xmlns:a16="http://schemas.microsoft.com/office/drawing/2014/main" id="{15CDD393-AC55-044C-A7B4-F81BF7533740}"/>
+              </a:ext>
+            </a:extLst>
+          </p:cNvPr>
+          <p:cNvPicPr>
+            <a:picLocks noChangeAspect="1"/>
+          </p:cNvPicPr>
+          <p:nvPr/>
+        </p:nvPicPr>
+        <p:blipFill rotWithShape="1">
+          <a:blip r:embed="rId3"/>
+          <a:srcRect l="15797" t="5797" r="24107"/>
+          <a:stretch/>
+        </p:blipFill>
+        <p:spPr>
+          <a:xfrm>
+            <a:off x="3325443" y="1712616"/>
+            <a:ext cx="2646738" cy="4148823"/>
+          </a:xfrm>
+          <a:prstGeom prst="rect">
+            <a:avLst/>
+          </a:prstGeom>
+        </p:spPr>
+      </p:pic>
+      <p:pic>
+        <p:nvPicPr>
+          <p:cNvPr id="9" name="Picture 8">
+            <a:extLst>
+              <a:ext uri="{FF2B5EF4-FFF2-40B4-BE49-F238E27FC236}">
+                <a16:creationId xmlns:a16="http://schemas.microsoft.com/office/drawing/2014/main" id="{AF6E913C-D0A8-6F42-AAE8-C8851BFC77BE}"/>
+              </a:ext>
+            </a:extLst>
+          </p:cNvPr>
+          <p:cNvPicPr>
+            <a:picLocks noChangeAspect="1"/>
+          </p:cNvPicPr>
+          <p:nvPr/>
+        </p:nvPicPr>
+        <p:blipFill rotWithShape="1">
+          <a:blip r:embed="rId4"/>
+          <a:srcRect l="15604" t="5797" r="24300"/>
+          <a:stretch/>
+        </p:blipFill>
+        <p:spPr>
+          <a:xfrm>
+            <a:off x="5962094" y="1712614"/>
+            <a:ext cx="2646738" cy="4148825"/>
+          </a:xfrm>
+          <a:prstGeom prst="rect">
+            <a:avLst/>
+          </a:prstGeom>
+        </p:spPr>
+      </p:pic>
+      <p:pic>
+        <p:nvPicPr>
+          <p:cNvPr id="11" name="Picture 10">
+            <a:extLst>
+              <a:ext uri="{FF2B5EF4-FFF2-40B4-BE49-F238E27FC236}">
+                <a16:creationId xmlns:a16="http://schemas.microsoft.com/office/drawing/2014/main" id="{7690CFC2-2147-564A-A87E-B25FF31164F4}"/>
+              </a:ext>
+            </a:extLst>
+          </p:cNvPr>
+          <p:cNvPicPr>
+            <a:picLocks noChangeAspect="1"/>
+          </p:cNvPicPr>
+          <p:nvPr/>
+        </p:nvPicPr>
+        <p:blipFill rotWithShape="1">
+          <a:blip r:embed="rId5"/>
+          <a:srcRect l="15604" t="5797"/>
+          <a:stretch/>
+        </p:blipFill>
+        <p:spPr>
+          <a:xfrm>
+            <a:off x="8598745" y="1717526"/>
+            <a:ext cx="3712524" cy="4143917"/>
+          </a:xfrm>
+          <a:prstGeom prst="rect">
+            <a:avLst/>
+          </a:prstGeom>
+        </p:spPr>
+      </p:pic>
+    </p:spTree>
+    <p:extLst>
+      <p:ext uri="{BB962C8B-B14F-4D97-AF65-F5344CB8AC3E}">
+        <p14:creationId xmlns:p14="http://schemas.microsoft.com/office/powerpoint/2010/main" val="3787903570"/>
+      </p:ext>
+    </p:extLst>
+  </p:cSld>
+  <p:clrMapOvr>
+    <a:masterClrMapping/>
+  </p:clrMapOvr>
+</p:sld>
+</file>
+
+<file path=ppt/slides/slide14.xml><?xml version="1.0" encoding="utf-8"?>
+<p:sld xmlns:a="http://schemas.openxmlformats.org/drawingml/2006/main" xmlns:r="http://schemas.openxmlformats.org/officeDocument/2006/relationships" xmlns:p="http://schemas.openxmlformats.org/presentationml/2006/main">
+  <p:cSld>
+    <p:spTree>
+      <p:nvGrpSpPr>
+        <p:cNvPr id="1" name=""/>
+        <p:cNvGrpSpPr/>
+        <p:nvPr/>
+      </p:nvGrpSpPr>
+      <p:grpSpPr>
+        <a:xfrm>
+          <a:off x="0" y="0"/>
+          <a:ext cx="0" cy="0"/>
+          <a:chOff x="0" y="0"/>
+          <a:chExt cx="0" cy="0"/>
+        </a:xfrm>
+      </p:grpSpPr>
+      <p:sp>
+        <p:nvSpPr>
+          <p:cNvPr id="6" name="TextBox 5">
+            <a:extLst>
+              <a:ext uri="{FF2B5EF4-FFF2-40B4-BE49-F238E27FC236}">
+                <a16:creationId xmlns:a16="http://schemas.microsoft.com/office/drawing/2014/main" id="{5C3E6C10-2305-6E46-B8CE-D2009F042578}"/>
+              </a:ext>
+            </a:extLst>
+          </p:cNvPr>
+          <p:cNvSpPr txBox="1"/>
+          <p:nvPr/>
+        </p:nvSpPr>
+        <p:spPr>
+          <a:xfrm>
+            <a:off x="764892" y="239302"/>
+            <a:ext cx="389850" cy="307777"/>
+          </a:xfrm>
+          <a:prstGeom prst="rect">
+            <a:avLst/>
+          </a:prstGeom>
+          <a:noFill/>
+        </p:spPr>
+        <p:txBody>
+          <a:bodyPr wrap="square" rtlCol="0">
+            <a:spAutoFit/>
+          </a:bodyPr>
+          <a:lstStyle/>
+          <a:p>
+            <a:r>
+              <a:rPr lang="en-US" sz="1400" dirty="0">
+                <a:latin typeface="Helvetica" pitchFamily="2" charset="0"/>
+              </a:rPr>
+              <a:t>a)</a:t>
+            </a:r>
+          </a:p>
+        </p:txBody>
+      </p:sp>
+      <p:sp>
+        <p:nvSpPr>
+          <p:cNvPr id="7" name="TextBox 6">
+            <a:extLst>
+              <a:ext uri="{FF2B5EF4-FFF2-40B4-BE49-F238E27FC236}">
+                <a16:creationId xmlns:a16="http://schemas.microsoft.com/office/drawing/2014/main" id="{49E1F3BF-9F09-D748-8A47-2C500E62CFFB}"/>
+              </a:ext>
+            </a:extLst>
+          </p:cNvPr>
+          <p:cNvSpPr txBox="1"/>
+          <p:nvPr/>
+        </p:nvSpPr>
+        <p:spPr>
+          <a:xfrm>
+            <a:off x="5706150" y="239302"/>
+            <a:ext cx="389850" cy="307777"/>
+          </a:xfrm>
+          <a:prstGeom prst="rect">
+            <a:avLst/>
+          </a:prstGeom>
+          <a:noFill/>
+        </p:spPr>
+        <p:txBody>
+          <a:bodyPr wrap="square" rtlCol="0">
+            <a:spAutoFit/>
+          </a:bodyPr>
+          <a:lstStyle/>
+          <a:p>
+            <a:r>
+              <a:rPr lang="en-US" sz="1400" dirty="0">
+                <a:latin typeface="Helvetica" pitchFamily="2" charset="0"/>
+              </a:rPr>
+              <a:t>b)</a:t>
+            </a:r>
+          </a:p>
+        </p:txBody>
+      </p:sp>
+      <p:pic>
+        <p:nvPicPr>
+          <p:cNvPr id="9" name="Picture 8">
+            <a:extLst>
+              <a:ext uri="{FF2B5EF4-FFF2-40B4-BE49-F238E27FC236}">
+                <a16:creationId xmlns:a16="http://schemas.microsoft.com/office/drawing/2014/main" id="{E4A126E7-F3FC-D445-9234-D80EABD18214}"/>
+              </a:ext>
+            </a:extLst>
+          </p:cNvPr>
+          <p:cNvPicPr>
+            <a:picLocks noChangeAspect="1"/>
+          </p:cNvPicPr>
+          <p:nvPr/>
+        </p:nvPicPr>
+        <p:blipFill rotWithShape="1">
+          <a:blip r:embed="rId3"/>
+          <a:srcRect t="5797" r="24107"/>
+          <a:stretch/>
+        </p:blipFill>
+        <p:spPr>
+          <a:xfrm>
+            <a:off x="659561" y="547079"/>
+            <a:ext cx="5204791" cy="6460435"/>
+          </a:xfrm>
+          <a:prstGeom prst="rect">
+            <a:avLst/>
+          </a:prstGeom>
+        </p:spPr>
+      </p:pic>
+      <p:pic>
+        <p:nvPicPr>
+          <p:cNvPr id="4" name="Picture 3">
+            <a:extLst>
+              <a:ext uri="{FF2B5EF4-FFF2-40B4-BE49-F238E27FC236}">
+                <a16:creationId xmlns:a16="http://schemas.microsoft.com/office/drawing/2014/main" id="{2E496D53-70E3-3E43-863E-BA92B0A13D13}"/>
+              </a:ext>
+            </a:extLst>
+          </p:cNvPr>
+          <p:cNvPicPr>
+            <a:picLocks noChangeAspect="1"/>
+          </p:cNvPicPr>
+          <p:nvPr/>
+        </p:nvPicPr>
+        <p:blipFill rotWithShape="1">
+          <a:blip r:embed="rId4"/>
+          <a:srcRect l="15670" t="5797"/>
+          <a:stretch/>
+        </p:blipFill>
+        <p:spPr>
+          <a:xfrm>
+            <a:off x="6327650" y="547078"/>
+            <a:ext cx="5783317" cy="6460436"/>
+          </a:xfrm>
+          <a:prstGeom prst="rect">
+            <a:avLst/>
+          </a:prstGeom>
+        </p:spPr>
+      </p:pic>
+    </p:spTree>
+    <p:extLst>
+      <p:ext uri="{BB962C8B-B14F-4D97-AF65-F5344CB8AC3E}">
+        <p14:creationId xmlns:p14="http://schemas.microsoft.com/office/powerpoint/2010/main" val="957440383"/>
       </p:ext>
     </p:extLst>
   </p:cSld>

</xml_diff>

<commit_message>
updating figures and cleaning repo
</commit_message>
<xml_diff>
--- a/analyses/figures/muplotextras/muplotprep.pptx
+++ b/analyses/figures/muplotextras/muplotprep.pptx
@@ -5,7 +5,7 @@
     <p:sldMasterId id="2147483648" r:id="rId1"/>
   </p:sldMasterIdLst>
   <p:notesMasterIdLst>
-    <p:notesMasterId r:id="rId17"/>
+    <p:notesMasterId r:id="rId18"/>
   </p:notesMasterIdLst>
   <p:sldIdLst>
     <p:sldId id="256" r:id="rId2"/>
@@ -23,6 +23,7 @@
     <p:sldId id="270" r:id="rId14"/>
     <p:sldId id="273" r:id="rId15"/>
     <p:sldId id="272" r:id="rId16"/>
+    <p:sldId id="274" r:id="rId17"/>
   </p:sldIdLst>
   <p:sldSz cx="12192000" cy="6858000"/>
   <p:notesSz cx="6858000" cy="9144000"/>
@@ -211,7 +212,7 @@
           <a:p>
             <a:fld id="{50109146-7479-554D-95AE-0AFDDADBF6E9}" type="datetimeFigureOut">
               <a:rPr lang="en-US" smtClean="0"/>
-              <a:t>12/12/20</a:t>
+              <a:t>2/3/21</a:t>
             </a:fld>
             <a:endParaRPr lang="en-US"/>
           </a:p>
@@ -877,7 +878,7 @@
           <a:p>
             <a:fld id="{61D5BA3A-DD4C-6840-8061-179B7C5E8DD5}" type="datetimeFigureOut">
               <a:rPr lang="en-US" smtClean="0"/>
-              <a:t>12/12/20</a:t>
+              <a:t>2/3/21</a:t>
             </a:fld>
             <a:endParaRPr lang="en-US"/>
           </a:p>
@@ -1075,7 +1076,7 @@
           <a:p>
             <a:fld id="{61D5BA3A-DD4C-6840-8061-179B7C5E8DD5}" type="datetimeFigureOut">
               <a:rPr lang="en-US" smtClean="0"/>
-              <a:t>12/12/20</a:t>
+              <a:t>2/3/21</a:t>
             </a:fld>
             <a:endParaRPr lang="en-US"/>
           </a:p>
@@ -1283,7 +1284,7 @@
           <a:p>
             <a:fld id="{61D5BA3A-DD4C-6840-8061-179B7C5E8DD5}" type="datetimeFigureOut">
               <a:rPr lang="en-US" smtClean="0"/>
-              <a:t>12/12/20</a:t>
+              <a:t>2/3/21</a:t>
             </a:fld>
             <a:endParaRPr lang="en-US"/>
           </a:p>
@@ -1481,7 +1482,7 @@
           <a:p>
             <a:fld id="{61D5BA3A-DD4C-6840-8061-179B7C5E8DD5}" type="datetimeFigureOut">
               <a:rPr lang="en-US" smtClean="0"/>
-              <a:t>12/12/20</a:t>
+              <a:t>2/3/21</a:t>
             </a:fld>
             <a:endParaRPr lang="en-US"/>
           </a:p>
@@ -1756,7 +1757,7 @@
           <a:p>
             <a:fld id="{61D5BA3A-DD4C-6840-8061-179B7C5E8DD5}" type="datetimeFigureOut">
               <a:rPr lang="en-US" smtClean="0"/>
-              <a:t>12/12/20</a:t>
+              <a:t>2/3/21</a:t>
             </a:fld>
             <a:endParaRPr lang="en-US"/>
           </a:p>
@@ -2021,7 +2022,7 @@
           <a:p>
             <a:fld id="{61D5BA3A-DD4C-6840-8061-179B7C5E8DD5}" type="datetimeFigureOut">
               <a:rPr lang="en-US" smtClean="0"/>
-              <a:t>12/12/20</a:t>
+              <a:t>2/3/21</a:t>
             </a:fld>
             <a:endParaRPr lang="en-US"/>
           </a:p>
@@ -2433,7 +2434,7 @@
           <a:p>
             <a:fld id="{61D5BA3A-DD4C-6840-8061-179B7C5E8DD5}" type="datetimeFigureOut">
               <a:rPr lang="en-US" smtClean="0"/>
-              <a:t>12/12/20</a:t>
+              <a:t>2/3/21</a:t>
             </a:fld>
             <a:endParaRPr lang="en-US"/>
           </a:p>
@@ -2574,7 +2575,7 @@
           <a:p>
             <a:fld id="{61D5BA3A-DD4C-6840-8061-179B7C5E8DD5}" type="datetimeFigureOut">
               <a:rPr lang="en-US" smtClean="0"/>
-              <a:t>12/12/20</a:t>
+              <a:t>2/3/21</a:t>
             </a:fld>
             <a:endParaRPr lang="en-US"/>
           </a:p>
@@ -2687,7 +2688,7 @@
           <a:p>
             <a:fld id="{61D5BA3A-DD4C-6840-8061-179B7C5E8DD5}" type="datetimeFigureOut">
               <a:rPr lang="en-US" smtClean="0"/>
-              <a:t>12/12/20</a:t>
+              <a:t>2/3/21</a:t>
             </a:fld>
             <a:endParaRPr lang="en-US"/>
           </a:p>
@@ -2998,7 +2999,7 @@
           <a:p>
             <a:fld id="{61D5BA3A-DD4C-6840-8061-179B7C5E8DD5}" type="datetimeFigureOut">
               <a:rPr lang="en-US" smtClean="0"/>
-              <a:t>12/12/20</a:t>
+              <a:t>2/3/21</a:t>
             </a:fld>
             <a:endParaRPr lang="en-US"/>
           </a:p>
@@ -3286,7 +3287,7 @@
           <a:p>
             <a:fld id="{61D5BA3A-DD4C-6840-8061-179B7C5E8DD5}" type="datetimeFigureOut">
               <a:rPr lang="en-US" smtClean="0"/>
-              <a:t>12/12/20</a:t>
+              <a:t>2/3/21</a:t>
             </a:fld>
             <a:endParaRPr lang="en-US"/>
           </a:p>
@@ -3527,7 +3528,7 @@
           <a:p>
             <a:fld id="{61D5BA3A-DD4C-6840-8061-179B7C5E8DD5}" type="datetimeFigureOut">
               <a:rPr lang="en-US" smtClean="0"/>
-              <a:t>12/12/20</a:t>
+              <a:t>2/3/21</a:t>
             </a:fld>
             <a:endParaRPr lang="en-US"/>
           </a:p>
@@ -5108,6 +5109,498 @@
     <p:extLst>
       <p:ext uri="{BB962C8B-B14F-4D97-AF65-F5344CB8AC3E}">
         <p14:creationId xmlns:p14="http://schemas.microsoft.com/office/powerpoint/2010/main" val="957440383"/>
+      </p:ext>
+    </p:extLst>
+  </p:cSld>
+  <p:clrMapOvr>
+    <a:masterClrMapping/>
+  </p:clrMapOvr>
+</p:sld>
+</file>
+
+<file path=ppt/slides/slide16.xml><?xml version="1.0" encoding="utf-8"?>
+<p:sld xmlns:a="http://schemas.openxmlformats.org/drawingml/2006/main" xmlns:r="http://schemas.openxmlformats.org/officeDocument/2006/relationships" xmlns:p="http://schemas.openxmlformats.org/presentationml/2006/main">
+  <p:cSld>
+    <p:spTree>
+      <p:nvGrpSpPr>
+        <p:cNvPr id="1" name=""/>
+        <p:cNvGrpSpPr/>
+        <p:nvPr/>
+      </p:nvGrpSpPr>
+      <p:grpSpPr>
+        <a:xfrm>
+          <a:off x="0" y="0"/>
+          <a:ext cx="0" cy="0"/>
+          <a:chOff x="0" y="0"/>
+          <a:chExt cx="0" cy="0"/>
+        </a:xfrm>
+      </p:grpSpPr>
+      <p:pic>
+        <p:nvPicPr>
+          <p:cNvPr id="5" name="Picture 4">
+            <a:extLst>
+              <a:ext uri="{FF2B5EF4-FFF2-40B4-BE49-F238E27FC236}">
+                <a16:creationId xmlns:a16="http://schemas.microsoft.com/office/drawing/2014/main" id="{8F37F119-9EE2-A649-A3B7-F66715B5B4EB}"/>
+              </a:ext>
+            </a:extLst>
+          </p:cNvPr>
+          <p:cNvPicPr>
+            <a:picLocks noChangeAspect="1"/>
+          </p:cNvPicPr>
+          <p:nvPr/>
+        </p:nvPicPr>
+        <p:blipFill rotWithShape="1">
+          <a:blip r:embed="rId2"/>
+          <a:srcRect r="23763"/>
+          <a:stretch/>
+        </p:blipFill>
+        <p:spPr>
+          <a:xfrm>
+            <a:off x="57186" y="-206645"/>
+            <a:ext cx="2841052" cy="3726657"/>
+          </a:xfrm>
+          <a:prstGeom prst="rect">
+            <a:avLst/>
+          </a:prstGeom>
+        </p:spPr>
+      </p:pic>
+      <p:pic>
+        <p:nvPicPr>
+          <p:cNvPr id="7" name="Picture 6">
+            <a:extLst>
+              <a:ext uri="{FF2B5EF4-FFF2-40B4-BE49-F238E27FC236}">
+                <a16:creationId xmlns:a16="http://schemas.microsoft.com/office/drawing/2014/main" id="{2AAF2E57-D155-4741-A1B9-04CE3C04D3DB}"/>
+              </a:ext>
+            </a:extLst>
+          </p:cNvPr>
+          <p:cNvPicPr>
+            <a:picLocks noChangeAspect="1"/>
+          </p:cNvPicPr>
+          <p:nvPr/>
+        </p:nvPicPr>
+        <p:blipFill rotWithShape="1">
+          <a:blip r:embed="rId3"/>
+          <a:srcRect l="18079"/>
+          <a:stretch/>
+        </p:blipFill>
+        <p:spPr>
+          <a:xfrm>
+            <a:off x="9178170" y="-206645"/>
+            <a:ext cx="3052916" cy="3726658"/>
+          </a:xfrm>
+          <a:prstGeom prst="rect">
+            <a:avLst/>
+          </a:prstGeom>
+        </p:spPr>
+      </p:pic>
+      <p:pic>
+        <p:nvPicPr>
+          <p:cNvPr id="9" name="Picture 8">
+            <a:extLst>
+              <a:ext uri="{FF2B5EF4-FFF2-40B4-BE49-F238E27FC236}">
+                <a16:creationId xmlns:a16="http://schemas.microsoft.com/office/drawing/2014/main" id="{D0E21ADC-EB59-6E41-A8F8-09C51BDA773A}"/>
+              </a:ext>
+            </a:extLst>
+          </p:cNvPr>
+          <p:cNvPicPr>
+            <a:picLocks noChangeAspect="1"/>
+          </p:cNvPicPr>
+          <p:nvPr/>
+        </p:nvPicPr>
+        <p:blipFill rotWithShape="1">
+          <a:blip r:embed="rId4"/>
+          <a:srcRect r="23764"/>
+          <a:stretch/>
+        </p:blipFill>
+        <p:spPr>
+          <a:xfrm>
+            <a:off x="1547674" y="3242303"/>
+            <a:ext cx="2841052" cy="3726658"/>
+          </a:xfrm>
+          <a:prstGeom prst="rect">
+            <a:avLst/>
+          </a:prstGeom>
+        </p:spPr>
+      </p:pic>
+      <p:pic>
+        <p:nvPicPr>
+          <p:cNvPr id="11" name="Picture 10">
+            <a:extLst>
+              <a:ext uri="{FF2B5EF4-FFF2-40B4-BE49-F238E27FC236}">
+                <a16:creationId xmlns:a16="http://schemas.microsoft.com/office/drawing/2014/main" id="{64C88DCE-263F-5343-B784-6504BF83AEC3}"/>
+              </a:ext>
+            </a:extLst>
+          </p:cNvPr>
+          <p:cNvPicPr>
+            <a:picLocks noChangeAspect="1"/>
+          </p:cNvPicPr>
+          <p:nvPr/>
+        </p:nvPicPr>
+        <p:blipFill rotWithShape="1">
+          <a:blip r:embed="rId5"/>
+          <a:srcRect l="17742" r="267"/>
+          <a:stretch/>
+        </p:blipFill>
+        <p:spPr>
+          <a:xfrm>
+            <a:off x="7840783" y="3242303"/>
+            <a:ext cx="3052915" cy="3723383"/>
+          </a:xfrm>
+          <a:prstGeom prst="rect">
+            <a:avLst/>
+          </a:prstGeom>
+        </p:spPr>
+      </p:pic>
+      <p:pic>
+        <p:nvPicPr>
+          <p:cNvPr id="13" name="Picture 12">
+            <a:extLst>
+              <a:ext uri="{FF2B5EF4-FFF2-40B4-BE49-F238E27FC236}">
+                <a16:creationId xmlns:a16="http://schemas.microsoft.com/office/drawing/2014/main" id="{6FC5800A-B228-474E-942A-CD74A4793EA2}"/>
+              </a:ext>
+            </a:extLst>
+          </p:cNvPr>
+          <p:cNvPicPr>
+            <a:picLocks noChangeAspect="1"/>
+          </p:cNvPicPr>
+          <p:nvPr/>
+        </p:nvPicPr>
+        <p:blipFill rotWithShape="1">
+          <a:blip r:embed="rId6"/>
+          <a:srcRect l="17986" r="24137"/>
+          <a:stretch/>
+        </p:blipFill>
+        <p:spPr>
+          <a:xfrm>
+            <a:off x="5032795" y="3230389"/>
+            <a:ext cx="2154444" cy="3722409"/>
+          </a:xfrm>
+          <a:prstGeom prst="rect">
+            <a:avLst/>
+          </a:prstGeom>
+        </p:spPr>
+      </p:pic>
+      <p:pic>
+        <p:nvPicPr>
+          <p:cNvPr id="17" name="Picture 16">
+            <a:extLst>
+              <a:ext uri="{FF2B5EF4-FFF2-40B4-BE49-F238E27FC236}">
+                <a16:creationId xmlns:a16="http://schemas.microsoft.com/office/drawing/2014/main" id="{7C2C068C-D61E-1F47-A881-EA06550BD84D}"/>
+              </a:ext>
+            </a:extLst>
+          </p:cNvPr>
+          <p:cNvPicPr>
+            <a:picLocks noChangeAspect="1"/>
+          </p:cNvPicPr>
+          <p:nvPr/>
+        </p:nvPicPr>
+        <p:blipFill rotWithShape="1">
+          <a:blip r:embed="rId7"/>
+          <a:srcRect l="17550" r="22773"/>
+          <a:stretch/>
+        </p:blipFill>
+        <p:spPr>
+          <a:xfrm>
+            <a:off x="6310155" y="-233398"/>
+            <a:ext cx="2223947" cy="3726659"/>
+          </a:xfrm>
+          <a:prstGeom prst="rect">
+            <a:avLst/>
+          </a:prstGeom>
+        </p:spPr>
+      </p:pic>
+      <p:pic>
+        <p:nvPicPr>
+          <p:cNvPr id="19" name="Picture 18">
+            <a:extLst>
+              <a:ext uri="{FF2B5EF4-FFF2-40B4-BE49-F238E27FC236}">
+                <a16:creationId xmlns:a16="http://schemas.microsoft.com/office/drawing/2014/main" id="{B7C7A607-DCD8-7245-A251-AF4A8DE53A8B}"/>
+              </a:ext>
+            </a:extLst>
+          </p:cNvPr>
+          <p:cNvPicPr>
+            <a:picLocks noChangeAspect="1"/>
+          </p:cNvPicPr>
+          <p:nvPr/>
+        </p:nvPicPr>
+        <p:blipFill rotWithShape="1">
+          <a:blip r:embed="rId8"/>
+          <a:srcRect l="18201" r="24949"/>
+          <a:stretch/>
+        </p:blipFill>
+        <p:spPr>
+          <a:xfrm>
+            <a:off x="3547459" y="-206645"/>
+            <a:ext cx="2118628" cy="3726657"/>
+          </a:xfrm>
+          <a:prstGeom prst="rect">
+            <a:avLst/>
+          </a:prstGeom>
+        </p:spPr>
+      </p:pic>
+      <p:sp>
+        <p:nvSpPr>
+          <p:cNvPr id="10" name="TextBox 9">
+            <a:extLst>
+              <a:ext uri="{FF2B5EF4-FFF2-40B4-BE49-F238E27FC236}">
+                <a16:creationId xmlns:a16="http://schemas.microsoft.com/office/drawing/2014/main" id="{72051CFF-53F4-B547-9C27-D65C7B2EA9EA}"/>
+              </a:ext>
+            </a:extLst>
+          </p:cNvPr>
+          <p:cNvSpPr txBox="1"/>
+          <p:nvPr/>
+        </p:nvSpPr>
+        <p:spPr>
+          <a:xfrm>
+            <a:off x="-29496" y="0"/>
+            <a:ext cx="389850" cy="261610"/>
+          </a:xfrm>
+          <a:prstGeom prst="rect">
+            <a:avLst/>
+          </a:prstGeom>
+          <a:noFill/>
+        </p:spPr>
+        <p:txBody>
+          <a:bodyPr wrap="square" rtlCol="0">
+            <a:spAutoFit/>
+          </a:bodyPr>
+          <a:lstStyle/>
+          <a:p>
+            <a:r>
+              <a:rPr lang="en-US" sz="1100" b="1" dirty="0">
+                <a:latin typeface="Helvetica" pitchFamily="2" charset="0"/>
+              </a:rPr>
+              <a:t>a)</a:t>
+            </a:r>
+          </a:p>
+        </p:txBody>
+      </p:sp>
+      <p:sp>
+        <p:nvSpPr>
+          <p:cNvPr id="14" name="TextBox 13">
+            <a:extLst>
+              <a:ext uri="{FF2B5EF4-FFF2-40B4-BE49-F238E27FC236}">
+                <a16:creationId xmlns:a16="http://schemas.microsoft.com/office/drawing/2014/main" id="{4BE68DFC-F66D-8041-A808-4DBCF43A2DCF}"/>
+              </a:ext>
+            </a:extLst>
+          </p:cNvPr>
+          <p:cNvSpPr txBox="1"/>
+          <p:nvPr/>
+        </p:nvSpPr>
+        <p:spPr>
+          <a:xfrm>
+            <a:off x="3226196" y="0"/>
+            <a:ext cx="389850" cy="261610"/>
+          </a:xfrm>
+          <a:prstGeom prst="rect">
+            <a:avLst/>
+          </a:prstGeom>
+          <a:noFill/>
+        </p:spPr>
+        <p:txBody>
+          <a:bodyPr wrap="square" rtlCol="0">
+            <a:spAutoFit/>
+          </a:bodyPr>
+          <a:lstStyle/>
+          <a:p>
+            <a:r>
+              <a:rPr lang="en-US" sz="1100" b="1" dirty="0">
+                <a:latin typeface="Helvetica" pitchFamily="2" charset="0"/>
+              </a:rPr>
+              <a:t>b)</a:t>
+            </a:r>
+          </a:p>
+        </p:txBody>
+      </p:sp>
+      <p:sp>
+        <p:nvSpPr>
+          <p:cNvPr id="15" name="TextBox 14">
+            <a:extLst>
+              <a:ext uri="{FF2B5EF4-FFF2-40B4-BE49-F238E27FC236}">
+                <a16:creationId xmlns:a16="http://schemas.microsoft.com/office/drawing/2014/main" id="{05E49217-5D96-7148-BB9D-7A6B5278A0C8}"/>
+              </a:ext>
+            </a:extLst>
+          </p:cNvPr>
+          <p:cNvSpPr txBox="1"/>
+          <p:nvPr/>
+        </p:nvSpPr>
+        <p:spPr>
+          <a:xfrm>
+            <a:off x="5994045" y="0"/>
+            <a:ext cx="389850" cy="261610"/>
+          </a:xfrm>
+          <a:prstGeom prst="rect">
+            <a:avLst/>
+          </a:prstGeom>
+          <a:noFill/>
+        </p:spPr>
+        <p:txBody>
+          <a:bodyPr wrap="square" rtlCol="0">
+            <a:spAutoFit/>
+          </a:bodyPr>
+          <a:lstStyle/>
+          <a:p>
+            <a:r>
+              <a:rPr lang="en-US" sz="1100" b="1" dirty="0">
+                <a:latin typeface="Helvetica" pitchFamily="2" charset="0"/>
+              </a:rPr>
+              <a:t>c)</a:t>
+            </a:r>
+          </a:p>
+        </p:txBody>
+      </p:sp>
+      <p:sp>
+        <p:nvSpPr>
+          <p:cNvPr id="16" name="TextBox 15">
+            <a:extLst>
+              <a:ext uri="{FF2B5EF4-FFF2-40B4-BE49-F238E27FC236}">
+                <a16:creationId xmlns:a16="http://schemas.microsoft.com/office/drawing/2014/main" id="{DBE55ECE-655B-F447-AB8E-19F3FE8BA33B}"/>
+              </a:ext>
+            </a:extLst>
+          </p:cNvPr>
+          <p:cNvSpPr txBox="1"/>
+          <p:nvPr/>
+        </p:nvSpPr>
+        <p:spPr>
+          <a:xfrm>
+            <a:off x="8817816" y="0"/>
+            <a:ext cx="389850" cy="261610"/>
+          </a:xfrm>
+          <a:prstGeom prst="rect">
+            <a:avLst/>
+          </a:prstGeom>
+          <a:noFill/>
+        </p:spPr>
+        <p:txBody>
+          <a:bodyPr wrap="square" rtlCol="0">
+            <a:spAutoFit/>
+          </a:bodyPr>
+          <a:lstStyle/>
+          <a:p>
+            <a:r>
+              <a:rPr lang="en-US" sz="1100" b="1" dirty="0">
+                <a:latin typeface="Helvetica" pitchFamily="2" charset="0"/>
+              </a:rPr>
+              <a:t>d)</a:t>
+            </a:r>
+          </a:p>
+        </p:txBody>
+      </p:sp>
+      <p:sp>
+        <p:nvSpPr>
+          <p:cNvPr id="18" name="TextBox 17">
+            <a:extLst>
+              <a:ext uri="{FF2B5EF4-FFF2-40B4-BE49-F238E27FC236}">
+                <a16:creationId xmlns:a16="http://schemas.microsoft.com/office/drawing/2014/main" id="{02114D1F-D230-BA49-AA75-57C52F56D850}"/>
+              </a:ext>
+            </a:extLst>
+          </p:cNvPr>
+          <p:cNvSpPr txBox="1"/>
+          <p:nvPr/>
+        </p:nvSpPr>
+        <p:spPr>
+          <a:xfrm>
+            <a:off x="1396993" y="3476407"/>
+            <a:ext cx="389850" cy="261610"/>
+          </a:xfrm>
+          <a:prstGeom prst="rect">
+            <a:avLst/>
+          </a:prstGeom>
+          <a:noFill/>
+        </p:spPr>
+        <p:txBody>
+          <a:bodyPr wrap="square" rtlCol="0">
+            <a:spAutoFit/>
+          </a:bodyPr>
+          <a:lstStyle/>
+          <a:p>
+            <a:r>
+              <a:rPr lang="en-US" sz="1100" b="1" dirty="0">
+                <a:latin typeface="Helvetica" pitchFamily="2" charset="0"/>
+              </a:rPr>
+              <a:t>e)</a:t>
+            </a:r>
+          </a:p>
+        </p:txBody>
+      </p:sp>
+      <p:sp>
+        <p:nvSpPr>
+          <p:cNvPr id="20" name="TextBox 19">
+            <a:extLst>
+              <a:ext uri="{FF2B5EF4-FFF2-40B4-BE49-F238E27FC236}">
+                <a16:creationId xmlns:a16="http://schemas.microsoft.com/office/drawing/2014/main" id="{4D7DA5D9-702F-164B-A1EB-B33012DCE53D}"/>
+              </a:ext>
+            </a:extLst>
+          </p:cNvPr>
+          <p:cNvSpPr txBox="1"/>
+          <p:nvPr/>
+        </p:nvSpPr>
+        <p:spPr>
+          <a:xfrm>
+            <a:off x="4760796" y="3476407"/>
+            <a:ext cx="389850" cy="261610"/>
+          </a:xfrm>
+          <a:prstGeom prst="rect">
+            <a:avLst/>
+          </a:prstGeom>
+          <a:noFill/>
+        </p:spPr>
+        <p:txBody>
+          <a:bodyPr wrap="square" rtlCol="0">
+            <a:spAutoFit/>
+          </a:bodyPr>
+          <a:lstStyle/>
+          <a:p>
+            <a:r>
+              <a:rPr lang="en-US" sz="1100" b="1" dirty="0">
+                <a:latin typeface="Helvetica" pitchFamily="2" charset="0"/>
+              </a:rPr>
+              <a:t>f)</a:t>
+            </a:r>
+          </a:p>
+        </p:txBody>
+      </p:sp>
+      <p:sp>
+        <p:nvSpPr>
+          <p:cNvPr id="21" name="TextBox 20">
+            <a:extLst>
+              <a:ext uri="{FF2B5EF4-FFF2-40B4-BE49-F238E27FC236}">
+                <a16:creationId xmlns:a16="http://schemas.microsoft.com/office/drawing/2014/main" id="{F4A5412B-6875-C14D-ABE6-B1326EFEE4BB}"/>
+              </a:ext>
+            </a:extLst>
+          </p:cNvPr>
+          <p:cNvSpPr txBox="1"/>
+          <p:nvPr/>
+        </p:nvSpPr>
+        <p:spPr>
+          <a:xfrm>
+            <a:off x="7541113" y="3463765"/>
+            <a:ext cx="389850" cy="261610"/>
+          </a:xfrm>
+          <a:prstGeom prst="rect">
+            <a:avLst/>
+          </a:prstGeom>
+          <a:noFill/>
+        </p:spPr>
+        <p:txBody>
+          <a:bodyPr wrap="square" rtlCol="0">
+            <a:spAutoFit/>
+          </a:bodyPr>
+          <a:lstStyle/>
+          <a:p>
+            <a:r>
+              <a:rPr lang="en-US" sz="1100" b="1" dirty="0">
+                <a:latin typeface="Helvetica" pitchFamily="2" charset="0"/>
+              </a:rPr>
+              <a:t>g)</a:t>
+            </a:r>
+          </a:p>
+        </p:txBody>
+      </p:sp>
+    </p:spTree>
+    <p:extLst>
+      <p:ext uri="{BB962C8B-B14F-4D97-AF65-F5344CB8AC3E}">
+        <p14:creationId xmlns:p14="http://schemas.microsoft.com/office/powerpoint/2010/main" val="2956211203"/>
       </p:ext>
     </p:extLst>
   </p:cSld>

</xml_diff>

<commit_message>
more resp to reviewers
</commit_message>
<xml_diff>
--- a/analyses/figures/muplotextras/muplotprep.pptx
+++ b/analyses/figures/muplotextras/muplotprep.pptx
@@ -212,7 +212,7 @@
           <a:p>
             <a:fld id="{50109146-7479-554D-95AE-0AFDDADBF6E9}" type="datetimeFigureOut">
               <a:rPr lang="en-US" smtClean="0"/>
-              <a:t>2/3/21</a:t>
+              <a:t>4/1/21</a:t>
             </a:fld>
             <a:endParaRPr lang="en-US"/>
           </a:p>
@@ -878,7 +878,7 @@
           <a:p>
             <a:fld id="{61D5BA3A-DD4C-6840-8061-179B7C5E8DD5}" type="datetimeFigureOut">
               <a:rPr lang="en-US" smtClean="0"/>
-              <a:t>2/3/21</a:t>
+              <a:t>4/1/21</a:t>
             </a:fld>
             <a:endParaRPr lang="en-US"/>
           </a:p>
@@ -1076,7 +1076,7 @@
           <a:p>
             <a:fld id="{61D5BA3A-DD4C-6840-8061-179B7C5E8DD5}" type="datetimeFigureOut">
               <a:rPr lang="en-US" smtClean="0"/>
-              <a:t>2/3/21</a:t>
+              <a:t>4/1/21</a:t>
             </a:fld>
             <a:endParaRPr lang="en-US"/>
           </a:p>
@@ -1284,7 +1284,7 @@
           <a:p>
             <a:fld id="{61D5BA3A-DD4C-6840-8061-179B7C5E8DD5}" type="datetimeFigureOut">
               <a:rPr lang="en-US" smtClean="0"/>
-              <a:t>2/3/21</a:t>
+              <a:t>4/1/21</a:t>
             </a:fld>
             <a:endParaRPr lang="en-US"/>
           </a:p>
@@ -1482,7 +1482,7 @@
           <a:p>
             <a:fld id="{61D5BA3A-DD4C-6840-8061-179B7C5E8DD5}" type="datetimeFigureOut">
               <a:rPr lang="en-US" smtClean="0"/>
-              <a:t>2/3/21</a:t>
+              <a:t>4/1/21</a:t>
             </a:fld>
             <a:endParaRPr lang="en-US"/>
           </a:p>
@@ -1757,7 +1757,7 @@
           <a:p>
             <a:fld id="{61D5BA3A-DD4C-6840-8061-179B7C5E8DD5}" type="datetimeFigureOut">
               <a:rPr lang="en-US" smtClean="0"/>
-              <a:t>2/3/21</a:t>
+              <a:t>4/1/21</a:t>
             </a:fld>
             <a:endParaRPr lang="en-US"/>
           </a:p>
@@ -2022,7 +2022,7 @@
           <a:p>
             <a:fld id="{61D5BA3A-DD4C-6840-8061-179B7C5E8DD5}" type="datetimeFigureOut">
               <a:rPr lang="en-US" smtClean="0"/>
-              <a:t>2/3/21</a:t>
+              <a:t>4/1/21</a:t>
             </a:fld>
             <a:endParaRPr lang="en-US"/>
           </a:p>
@@ -2434,7 +2434,7 @@
           <a:p>
             <a:fld id="{61D5BA3A-DD4C-6840-8061-179B7C5E8DD5}" type="datetimeFigureOut">
               <a:rPr lang="en-US" smtClean="0"/>
-              <a:t>2/3/21</a:t>
+              <a:t>4/1/21</a:t>
             </a:fld>
             <a:endParaRPr lang="en-US"/>
           </a:p>
@@ -2575,7 +2575,7 @@
           <a:p>
             <a:fld id="{61D5BA3A-DD4C-6840-8061-179B7C5E8DD5}" type="datetimeFigureOut">
               <a:rPr lang="en-US" smtClean="0"/>
-              <a:t>2/3/21</a:t>
+              <a:t>4/1/21</a:t>
             </a:fld>
             <a:endParaRPr lang="en-US"/>
           </a:p>
@@ -2688,7 +2688,7 @@
           <a:p>
             <a:fld id="{61D5BA3A-DD4C-6840-8061-179B7C5E8DD5}" type="datetimeFigureOut">
               <a:rPr lang="en-US" smtClean="0"/>
-              <a:t>2/3/21</a:t>
+              <a:t>4/1/21</a:t>
             </a:fld>
             <a:endParaRPr lang="en-US"/>
           </a:p>
@@ -2999,7 +2999,7 @@
           <a:p>
             <a:fld id="{61D5BA3A-DD4C-6840-8061-179B7C5E8DD5}" type="datetimeFigureOut">
               <a:rPr lang="en-US" smtClean="0"/>
-              <a:t>2/3/21</a:t>
+              <a:t>4/1/21</a:t>
             </a:fld>
             <a:endParaRPr lang="en-US"/>
           </a:p>
@@ -3287,7 +3287,7 @@
           <a:p>
             <a:fld id="{61D5BA3A-DD4C-6840-8061-179B7C5E8DD5}" type="datetimeFigureOut">
               <a:rPr lang="en-US" smtClean="0"/>
-              <a:t>2/3/21</a:t>
+              <a:t>4/1/21</a:t>
             </a:fld>
             <a:endParaRPr lang="en-US"/>
           </a:p>
@@ -3528,7 +3528,7 @@
           <a:p>
             <a:fld id="{61D5BA3A-DD4C-6840-8061-179B7C5E8DD5}" type="datetimeFigureOut">
               <a:rPr lang="en-US" smtClean="0"/>
-              <a:t>2/3/21</a:t>
+              <a:t>4/1/21</a:t>
             </a:fld>
             <a:endParaRPr lang="en-US"/>
           </a:p>
@@ -5180,13 +5180,13 @@
         </p:nvPicPr>
         <p:blipFill rotWithShape="1">
           <a:blip r:embed="rId3"/>
-          <a:srcRect l="18079"/>
+          <a:srcRect l="-506" r="24075"/>
           <a:stretch/>
         </p:blipFill>
         <p:spPr>
           <a:xfrm>
-            <a:off x="9178170" y="-206645"/>
-            <a:ext cx="3052916" cy="3726658"/>
+            <a:off x="1670360" y="3226140"/>
+            <a:ext cx="2848362" cy="3726658"/>
           </a:xfrm>
           <a:prstGeom prst="rect">
             <a:avLst/>
@@ -5209,13 +5209,13 @@
         </p:nvPicPr>
         <p:blipFill rotWithShape="1">
           <a:blip r:embed="rId4"/>
-          <a:srcRect r="23764"/>
+          <a:srcRect l="18932" r="1520"/>
           <a:stretch/>
         </p:blipFill>
         <p:spPr>
           <a:xfrm>
-            <a:off x="1547674" y="3242303"/>
-            <a:ext cx="2841052" cy="3726658"/>
+            <a:off x="9143193" y="-206645"/>
+            <a:ext cx="2964501" cy="3726658"/>
           </a:xfrm>
           <a:prstGeom prst="rect">
             <a:avLst/>

</xml_diff>